<commit_message>
New figures for BC
</commit_message>
<xml_diff>
--- a/content/maxwell1_fundamentals/fundamental_laws/images/BC_1.pptx
+++ b/content/maxwell1_fundamentals/fundamental_laws/images/BC_1.pptx
@@ -6,6 +6,8 @@
   </p:sldMasterIdLst>
   <p:sldIdLst>
     <p:sldId id="256" r:id="rId2"/>
+    <p:sldId id="258" r:id="rId3"/>
+    <p:sldId id="259" r:id="rId4"/>
   </p:sldIdLst>
   <p:sldSz cx="9144000" cy="6858000" type="screen4x3"/>
   <p:notesSz cx="6858000" cy="9144000"/>
@@ -288,7 +290,7 @@
           <a:p>
             <a:fld id="{044FDD51-7EA2-AE42-BDCF-AA1B218633D7}" type="datetimeFigureOut">
               <a:rPr lang="en-US" smtClean="0"/>
-              <a:t>15-11-09</a:t>
+              <a:t>15-11-16</a:t>
             </a:fld>
             <a:endParaRPr lang="en-US"/>
           </a:p>
@@ -458,7 +460,7 @@
           <a:p>
             <a:fld id="{044FDD51-7EA2-AE42-BDCF-AA1B218633D7}" type="datetimeFigureOut">
               <a:rPr lang="en-US" smtClean="0"/>
-              <a:t>15-11-09</a:t>
+              <a:t>15-11-16</a:t>
             </a:fld>
             <a:endParaRPr lang="en-US"/>
           </a:p>
@@ -638,7 +640,7 @@
           <a:p>
             <a:fld id="{044FDD51-7EA2-AE42-BDCF-AA1B218633D7}" type="datetimeFigureOut">
               <a:rPr lang="en-US" smtClean="0"/>
-              <a:t>15-11-09</a:t>
+              <a:t>15-11-16</a:t>
             </a:fld>
             <a:endParaRPr lang="en-US"/>
           </a:p>
@@ -808,7 +810,7 @@
           <a:p>
             <a:fld id="{044FDD51-7EA2-AE42-BDCF-AA1B218633D7}" type="datetimeFigureOut">
               <a:rPr lang="en-US" smtClean="0"/>
-              <a:t>15-11-09</a:t>
+              <a:t>15-11-16</a:t>
             </a:fld>
             <a:endParaRPr lang="en-US"/>
           </a:p>
@@ -1054,7 +1056,7 @@
           <a:p>
             <a:fld id="{044FDD51-7EA2-AE42-BDCF-AA1B218633D7}" type="datetimeFigureOut">
               <a:rPr lang="en-US" smtClean="0"/>
-              <a:t>15-11-09</a:t>
+              <a:t>15-11-16</a:t>
             </a:fld>
             <a:endParaRPr lang="en-US"/>
           </a:p>
@@ -1342,7 +1344,7 @@
           <a:p>
             <a:fld id="{044FDD51-7EA2-AE42-BDCF-AA1B218633D7}" type="datetimeFigureOut">
               <a:rPr lang="en-US" smtClean="0"/>
-              <a:t>15-11-09</a:t>
+              <a:t>15-11-16</a:t>
             </a:fld>
             <a:endParaRPr lang="en-US"/>
           </a:p>
@@ -1764,7 +1766,7 @@
           <a:p>
             <a:fld id="{044FDD51-7EA2-AE42-BDCF-AA1B218633D7}" type="datetimeFigureOut">
               <a:rPr lang="en-US" smtClean="0"/>
-              <a:t>15-11-09</a:t>
+              <a:t>15-11-16</a:t>
             </a:fld>
             <a:endParaRPr lang="en-US"/>
           </a:p>
@@ -1882,7 +1884,7 @@
           <a:p>
             <a:fld id="{044FDD51-7EA2-AE42-BDCF-AA1B218633D7}" type="datetimeFigureOut">
               <a:rPr lang="en-US" smtClean="0"/>
-              <a:t>15-11-09</a:t>
+              <a:t>15-11-16</a:t>
             </a:fld>
             <a:endParaRPr lang="en-US"/>
           </a:p>
@@ -1977,7 +1979,7 @@
           <a:p>
             <a:fld id="{044FDD51-7EA2-AE42-BDCF-AA1B218633D7}" type="datetimeFigureOut">
               <a:rPr lang="en-US" smtClean="0"/>
-              <a:t>15-11-09</a:t>
+              <a:t>15-11-16</a:t>
             </a:fld>
             <a:endParaRPr lang="en-US"/>
           </a:p>
@@ -2254,7 +2256,7 @@
           <a:p>
             <a:fld id="{044FDD51-7EA2-AE42-BDCF-AA1B218633D7}" type="datetimeFigureOut">
               <a:rPr lang="en-US" smtClean="0"/>
-              <a:t>15-11-09</a:t>
+              <a:t>15-11-16</a:t>
             </a:fld>
             <a:endParaRPr lang="en-US"/>
           </a:p>
@@ -2507,7 +2509,7 @@
           <a:p>
             <a:fld id="{044FDD51-7EA2-AE42-BDCF-AA1B218633D7}" type="datetimeFigureOut">
               <a:rPr lang="en-US" smtClean="0"/>
-              <a:t>15-11-09</a:t>
+              <a:t>15-11-16</a:t>
             </a:fld>
             <a:endParaRPr lang="en-US"/>
           </a:p>
@@ -2720,7 +2722,7 @@
           <a:p>
             <a:fld id="{044FDD51-7EA2-AE42-BDCF-AA1B218633D7}" type="datetimeFigureOut">
               <a:rPr lang="en-US" smtClean="0"/>
-              <a:t>15-11-09</a:t>
+              <a:t>15-11-16</a:t>
             </a:fld>
             <a:endParaRPr lang="en-US"/>
           </a:p>
@@ -3095,416 +3097,410 @@
           <a:chExt cx="0" cy="0"/>
         </a:xfrm>
       </p:grpSpPr>
-      <p:grpSp>
-        <p:nvGrpSpPr>
-          <p:cNvPr id="49" name="Group 48"/>
-          <p:cNvGrpSpPr/>
+      <p:sp>
+        <p:nvSpPr>
+          <p:cNvPr id="28" name="Rectangle 27"/>
+          <p:cNvSpPr/>
           <p:nvPr/>
-        </p:nvGrpSpPr>
-        <p:grpSpPr>
+        </p:nvSpPr>
+        <p:spPr>
           <a:xfrm>
-            <a:off x="347767" y="1882218"/>
-            <a:ext cx="8633690" cy="1999168"/>
-            <a:chOff x="347767" y="1882218"/>
-            <a:chExt cx="8633690" cy="1999168"/>
+            <a:off x="351171" y="1598965"/>
+            <a:ext cx="5625426" cy="1310036"/>
           </a:xfrm>
-        </p:grpSpPr>
-        <p:cxnSp>
-          <p:nvCxnSpPr>
-            <p:cNvPr id="7" name="Straight Connector 6"/>
-            <p:cNvCxnSpPr/>
-            <p:nvPr/>
-          </p:nvCxnSpPr>
-          <p:spPr>
-            <a:xfrm>
-              <a:off x="347767" y="2887579"/>
-              <a:ext cx="8633690" cy="0"/>
-            </a:xfrm>
-            <a:prstGeom prst="line">
-              <a:avLst/>
-            </a:prstGeom>
-            <a:ln w="38100" cmpd="sng">
-              <a:solidFill>
-                <a:schemeClr val="tx1"/>
-              </a:solidFill>
-            </a:ln>
-          </p:spPr>
-          <p:style>
-            <a:lnRef idx="2">
-              <a:schemeClr val="accent1"/>
-            </a:lnRef>
-            <a:fillRef idx="0">
-              <a:schemeClr val="accent1"/>
-            </a:fillRef>
-            <a:effectRef idx="1">
-              <a:schemeClr val="accent1"/>
-            </a:effectRef>
-            <a:fontRef idx="minor">
+          <a:prstGeom prst="rect">
+            <a:avLst/>
+          </a:prstGeom>
+          <a:solidFill>
+            <a:schemeClr val="accent2">
+              <a:lumMod val="75000"/>
+              <a:alpha val="32000"/>
+            </a:schemeClr>
+          </a:solidFill>
+          <a:ln>
+            <a:noFill/>
+          </a:ln>
+        </p:spPr>
+        <p:style>
+          <a:lnRef idx="1">
+            <a:schemeClr val="accent1"/>
+          </a:lnRef>
+          <a:fillRef idx="3">
+            <a:schemeClr val="accent1"/>
+          </a:fillRef>
+          <a:effectRef idx="2">
+            <a:schemeClr val="accent1"/>
+          </a:effectRef>
+          <a:fontRef idx="minor">
+            <a:schemeClr val="lt1"/>
+          </a:fontRef>
+        </p:style>
+        <p:txBody>
+          <a:bodyPr rtlCol="0" anchor="ctr"/>
+          <a:lstStyle/>
+          <a:p>
+            <a:pPr algn="ctr"/>
+            <a:endParaRPr lang="en-US"/>
+          </a:p>
+        </p:txBody>
+      </p:sp>
+      <p:sp>
+        <p:nvSpPr>
+          <p:cNvPr id="29" name="Rectangle 28"/>
+          <p:cNvSpPr/>
+          <p:nvPr/>
+        </p:nvSpPr>
+        <p:spPr>
+          <a:xfrm>
+            <a:off x="351171" y="2856532"/>
+            <a:ext cx="5625426" cy="1310036"/>
+          </a:xfrm>
+          <a:prstGeom prst="rect">
+            <a:avLst/>
+          </a:prstGeom>
+          <a:solidFill>
+            <a:schemeClr val="tx2">
+              <a:lumMod val="75000"/>
+              <a:alpha val="23000"/>
+            </a:schemeClr>
+          </a:solidFill>
+          <a:ln>
+            <a:noFill/>
+          </a:ln>
+        </p:spPr>
+        <p:style>
+          <a:lnRef idx="1">
+            <a:schemeClr val="accent1"/>
+          </a:lnRef>
+          <a:fillRef idx="3">
+            <a:schemeClr val="accent1"/>
+          </a:fillRef>
+          <a:effectRef idx="2">
+            <a:schemeClr val="accent1"/>
+          </a:effectRef>
+          <a:fontRef idx="minor">
+            <a:schemeClr val="lt1"/>
+          </a:fontRef>
+        </p:style>
+        <p:txBody>
+          <a:bodyPr rtlCol="0" anchor="ctr"/>
+          <a:lstStyle/>
+          <a:p>
+            <a:pPr algn="ctr"/>
+            <a:endParaRPr lang="en-US"/>
+          </a:p>
+        </p:txBody>
+      </p:sp>
+      <p:cxnSp>
+        <p:nvCxnSpPr>
+          <p:cNvPr id="7" name="Straight Connector 6"/>
+          <p:cNvCxnSpPr/>
+          <p:nvPr/>
+        </p:nvCxnSpPr>
+        <p:spPr>
+          <a:xfrm>
+            <a:off x="347767" y="2887579"/>
+            <a:ext cx="5628830" cy="21422"/>
+          </a:xfrm>
+          <a:prstGeom prst="line">
+            <a:avLst/>
+          </a:prstGeom>
+          <a:ln w="38100" cmpd="sng">
+            <a:solidFill>
               <a:schemeClr val="tx1"/>
-            </a:fontRef>
-          </p:style>
-        </p:cxnSp>
-        <p:grpSp>
-          <p:nvGrpSpPr>
-            <p:cNvPr id="48" name="Group 47"/>
-            <p:cNvGrpSpPr/>
-            <p:nvPr/>
-          </p:nvGrpSpPr>
-          <p:grpSpPr>
-            <a:xfrm>
-              <a:off x="2072926" y="1882218"/>
-              <a:ext cx="2298967" cy="1999168"/>
-              <a:chOff x="2072926" y="1882218"/>
-              <a:chExt cx="2298967" cy="1999168"/>
-            </a:xfrm>
-          </p:grpSpPr>
-          <p:cxnSp>
-            <p:nvCxnSpPr>
-              <p:cNvPr id="9" name="Straight Arrow Connector 8"/>
-              <p:cNvCxnSpPr/>
-              <p:nvPr/>
-            </p:nvCxnSpPr>
-            <p:spPr>
-              <a:xfrm>
-                <a:off x="2072926" y="1882218"/>
-                <a:ext cx="529211" cy="891974"/>
-              </a:xfrm>
-              <a:prstGeom prst="straightConnector1">
-                <a:avLst/>
-              </a:prstGeom>
-              <a:ln>
+            </a:solidFill>
+          </a:ln>
+        </p:spPr>
+        <p:style>
+          <a:lnRef idx="2">
+            <a:schemeClr val="accent1"/>
+          </a:lnRef>
+          <a:fillRef idx="0">
+            <a:schemeClr val="accent1"/>
+          </a:fillRef>
+          <a:effectRef idx="1">
+            <a:schemeClr val="accent1"/>
+          </a:effectRef>
+          <a:fontRef idx="minor">
+            <a:schemeClr val="tx1"/>
+          </a:fontRef>
+        </p:style>
+      </p:cxnSp>
+      <p:cxnSp>
+        <p:nvCxnSpPr>
+          <p:cNvPr id="9" name="Straight Arrow Connector 8"/>
+          <p:cNvCxnSpPr/>
+          <p:nvPr/>
+        </p:nvCxnSpPr>
+        <p:spPr>
+          <a:xfrm>
+            <a:off x="2058152" y="1882218"/>
+            <a:ext cx="524679" cy="891974"/>
+          </a:xfrm>
+          <a:prstGeom prst="straightConnector1">
+            <a:avLst/>
+          </a:prstGeom>
+          <a:ln>
+            <a:solidFill>
+              <a:schemeClr val="tx1">
+                <a:lumMod val="95000"/>
+                <a:lumOff val="5000"/>
+              </a:schemeClr>
+            </a:solidFill>
+            <a:tailEnd type="arrow"/>
+          </a:ln>
+        </p:spPr>
+        <p:style>
+          <a:lnRef idx="2">
+            <a:schemeClr val="accent1"/>
+          </a:lnRef>
+          <a:fillRef idx="0">
+            <a:schemeClr val="accent1"/>
+          </a:fillRef>
+          <a:effectRef idx="1">
+            <a:schemeClr val="accent1"/>
+          </a:effectRef>
+          <a:fontRef idx="minor">
+            <a:schemeClr val="tx1"/>
+          </a:fontRef>
+        </p:style>
+      </p:cxnSp>
+      <p:cxnSp>
+        <p:nvCxnSpPr>
+          <p:cNvPr id="10" name="Straight Arrow Connector 9"/>
+          <p:cNvCxnSpPr/>
+          <p:nvPr/>
+        </p:nvCxnSpPr>
+        <p:spPr>
+          <a:xfrm>
+            <a:off x="2702758" y="2989412"/>
+            <a:ext cx="524679" cy="891974"/>
+          </a:xfrm>
+          <a:prstGeom prst="straightConnector1">
+            <a:avLst/>
+          </a:prstGeom>
+          <a:ln>
+            <a:solidFill>
+              <a:schemeClr val="tx1">
+                <a:lumMod val="95000"/>
+                <a:lumOff val="5000"/>
+              </a:schemeClr>
+            </a:solidFill>
+            <a:tailEnd type="arrow"/>
+          </a:ln>
+        </p:spPr>
+        <p:style>
+          <a:lnRef idx="2">
+            <a:schemeClr val="accent1"/>
+          </a:lnRef>
+          <a:fillRef idx="0">
+            <a:schemeClr val="accent1"/>
+          </a:fillRef>
+          <a:effectRef idx="1">
+            <a:schemeClr val="accent1"/>
+          </a:effectRef>
+          <a:fontRef idx="minor">
+            <a:schemeClr val="tx1"/>
+          </a:fontRef>
+        </p:style>
+      </p:cxnSp>
+      <p:sp>
+        <p:nvSpPr>
+          <p:cNvPr id="12" name="TextBox 11"/>
+          <p:cNvSpPr txBox="1"/>
+          <p:nvPr/>
+        </p:nvSpPr>
+        <p:spPr>
+          <a:xfrm>
+            <a:off x="3538149" y="2261244"/>
+            <a:ext cx="1690186" cy="461665"/>
+          </a:xfrm>
+          <a:prstGeom prst="rect">
+            <a:avLst/>
+          </a:prstGeom>
+          <a:noFill/>
+        </p:spPr>
+        <p:txBody>
+          <a:bodyPr wrap="none" rtlCol="0">
+            <a:spAutoFit/>
+          </a:bodyPr>
+          <a:lstStyle/>
+          <a:p>
+            <a:r>
+              <a:rPr lang="en-US" sz="2400" b="1" dirty="0" smtClean="0"/>
+              <a:t>b</a:t>
+            </a:r>
+            <a:r>
+              <a:rPr lang="en-US" sz="2400" baseline="-25000" dirty="0" smtClean="0"/>
+              <a:t>1</a:t>
+            </a:r>
+            <a:r>
+              <a:rPr lang="en-US" sz="2400" dirty="0" smtClean="0"/>
+              <a:t>, </a:t>
+            </a:r>
+            <a:r>
+              <a:rPr lang="en-US" sz="2400" b="1" dirty="0" smtClean="0"/>
+              <a:t>d</a:t>
+            </a:r>
+            <a:r>
+              <a:rPr lang="en-US" sz="2400" baseline="-25000" dirty="0"/>
+              <a:t>1</a:t>
+            </a:r>
+            <a:r>
+              <a:rPr lang="en-US" sz="2400" dirty="0" smtClean="0"/>
+              <a:t>, </a:t>
+            </a:r>
+            <a:r>
+              <a:rPr lang="en-US" sz="2400" b="1" dirty="0" smtClean="0"/>
+              <a:t>e</a:t>
+            </a:r>
+            <a:r>
+              <a:rPr lang="en-US" sz="2400" baseline="-25000" dirty="0"/>
+              <a:t>1</a:t>
+            </a:r>
+            <a:r>
+              <a:rPr lang="en-US" sz="2400" dirty="0" smtClean="0"/>
+              <a:t>,</a:t>
+            </a:r>
+            <a:r>
+              <a:rPr lang="en-US" sz="2400" b="1" dirty="0" smtClean="0"/>
+              <a:t> </a:t>
+            </a:r>
+            <a:r>
+              <a:rPr lang="en-US" sz="2400" b="1" dirty="0" smtClean="0"/>
+              <a:t>h</a:t>
+            </a:r>
+            <a:r>
+              <a:rPr lang="en-US" sz="2400" baseline="-25000" dirty="0" smtClean="0"/>
+              <a:t>1</a:t>
+            </a:r>
+            <a:endParaRPr lang="en-US" sz="2400" b="1" baseline="-25000" dirty="0"/>
+          </a:p>
+        </p:txBody>
+      </p:sp>
+      <p:sp>
+        <p:nvSpPr>
+          <p:cNvPr id="14" name="TextBox 13"/>
+          <p:cNvSpPr txBox="1"/>
+          <p:nvPr/>
+        </p:nvSpPr>
+        <p:spPr>
+          <a:xfrm>
+            <a:off x="347767" y="2328205"/>
+            <a:ext cx="1826216" cy="461665"/>
+          </a:xfrm>
+          <a:prstGeom prst="rect">
+            <a:avLst/>
+          </a:prstGeom>
+          <a:noFill/>
+        </p:spPr>
+        <p:txBody>
+          <a:bodyPr wrap="none" rtlCol="0">
+            <a:spAutoFit/>
+          </a:bodyPr>
+          <a:lstStyle/>
+          <a:p>
+            <a:r>
+              <a:rPr lang="en-US" sz="2000" dirty="0" smtClean="0"/>
+              <a:t>Layer 1:  </a:t>
+            </a:r>
+            <a:r>
+              <a:rPr lang="en-US" sz="2000" dirty="0" smtClean="0"/>
+              <a:t>μ</a:t>
+            </a:r>
+            <a:r>
+              <a:rPr lang="en-US" sz="2400" baseline="-25000" dirty="0" smtClean="0"/>
+              <a:t>1</a:t>
+            </a:r>
+            <a:r>
+              <a:rPr lang="en-US" sz="2400" dirty="0" smtClean="0"/>
+              <a:t> </a:t>
+            </a:r>
+            <a:r>
+              <a:rPr lang="en-US" sz="2400" dirty="0" smtClean="0"/>
+              <a:t>, ε</a:t>
+            </a:r>
+            <a:r>
+              <a:rPr lang="en-US" sz="2400" baseline="-25000" dirty="0" smtClean="0"/>
+              <a:t>1</a:t>
+            </a:r>
+            <a:endParaRPr lang="en-US" sz="2400" baseline="-25000" dirty="0"/>
+          </a:p>
+        </p:txBody>
+      </p:sp>
+      <p:sp>
+        <p:nvSpPr>
+          <p:cNvPr id="18" name="TextBox 17"/>
+          <p:cNvSpPr txBox="1"/>
+          <p:nvPr/>
+        </p:nvSpPr>
+        <p:spPr>
+          <a:xfrm>
+            <a:off x="347767" y="3109887"/>
+            <a:ext cx="1826216" cy="461665"/>
+          </a:xfrm>
+          <a:prstGeom prst="rect">
+            <a:avLst/>
+          </a:prstGeom>
+          <a:noFill/>
+        </p:spPr>
+        <p:txBody>
+          <a:bodyPr wrap="none" rtlCol="0">
+            <a:spAutoFit/>
+          </a:bodyPr>
+          <a:lstStyle/>
+          <a:p>
+            <a:r>
+              <a:rPr lang="en-US" sz="2000" dirty="0" smtClean="0">
                 <a:solidFill>
-                  <a:schemeClr val="tx1">
-                    <a:lumMod val="95000"/>
-                    <a:lumOff val="5000"/>
-                  </a:schemeClr>
+                  <a:srgbClr val="000000"/>
                 </a:solidFill>
-                <a:tailEnd type="arrow"/>
-              </a:ln>
-            </p:spPr>
-            <p:style>
-              <a:lnRef idx="2">
-                <a:schemeClr val="accent1"/>
-              </a:lnRef>
-              <a:fillRef idx="0">
-                <a:schemeClr val="accent1"/>
-              </a:fillRef>
-              <a:effectRef idx="1">
-                <a:schemeClr val="accent1"/>
-              </a:effectRef>
-              <a:fontRef idx="minor">
-                <a:schemeClr val="tx1"/>
-              </a:fontRef>
-            </p:style>
-          </p:cxnSp>
-          <p:cxnSp>
-            <p:nvCxnSpPr>
-              <p:cNvPr id="10" name="Straight Arrow Connector 9"/>
-              <p:cNvCxnSpPr/>
-              <p:nvPr/>
-            </p:nvCxnSpPr>
-            <p:spPr>
-              <a:xfrm>
-                <a:off x="2723100" y="2989412"/>
-                <a:ext cx="529211" cy="891974"/>
-              </a:xfrm>
-              <a:prstGeom prst="straightConnector1">
-                <a:avLst/>
-              </a:prstGeom>
-              <a:ln>
+              </a:rPr>
+              <a:t>Layer 2:  </a:t>
+            </a:r>
+            <a:r>
+              <a:rPr lang="en-US" sz="2000" dirty="0" smtClean="0">
                 <a:solidFill>
-                  <a:schemeClr val="tx1">
-                    <a:lumMod val="95000"/>
-                    <a:lumOff val="5000"/>
-                  </a:schemeClr>
+                  <a:srgbClr val="000000"/>
                 </a:solidFill>
-                <a:tailEnd type="arrow"/>
-              </a:ln>
-            </p:spPr>
-            <p:style>
-              <a:lnRef idx="2">
-                <a:schemeClr val="accent1"/>
-              </a:lnRef>
-              <a:fillRef idx="0">
-                <a:schemeClr val="accent1"/>
-              </a:fillRef>
-              <a:effectRef idx="1">
-                <a:schemeClr val="accent1"/>
-              </a:effectRef>
-              <a:fontRef idx="minor">
-                <a:schemeClr val="tx1"/>
-              </a:fontRef>
-            </p:style>
-          </p:cxnSp>
-          <p:sp>
-            <p:nvSpPr>
-              <p:cNvPr id="12" name="TextBox 11"/>
-              <p:cNvSpPr txBox="1"/>
-              <p:nvPr/>
-            </p:nvSpPr>
-            <p:spPr>
-              <a:xfrm>
-                <a:off x="2723100" y="2328205"/>
-                <a:ext cx="1240544" cy="461665"/>
-              </a:xfrm>
-              <a:prstGeom prst="rect">
-                <a:avLst/>
-              </a:prstGeom>
-              <a:noFill/>
-            </p:spPr>
-            <p:txBody>
-              <a:bodyPr wrap="none" rtlCol="0">
-                <a:spAutoFit/>
-              </a:bodyPr>
-              <a:lstStyle/>
-              <a:p>
-                <a:r>
-                  <a:rPr lang="en-US" sz="2400" b="1" dirty="0" smtClean="0"/>
-                  <a:t>E</a:t>
-                </a:r>
-                <a:r>
-                  <a:rPr lang="en-US" sz="2400" baseline="-25000" dirty="0" smtClean="0"/>
-                  <a:t>1</a:t>
-                </a:r>
-                <a:r>
-                  <a:rPr lang="en-US" sz="2400" b="1" dirty="0" smtClean="0"/>
-                  <a:t>, D</a:t>
-                </a:r>
-                <a:r>
-                  <a:rPr lang="en-US" sz="2400" baseline="-25000" dirty="0" smtClean="0"/>
-                  <a:t>1</a:t>
-                </a:r>
-                <a:r>
-                  <a:rPr lang="en-US" sz="2400" b="1" dirty="0" smtClean="0"/>
-                  <a:t>, J</a:t>
-                </a:r>
-                <a:r>
-                  <a:rPr lang="en-US" sz="2400" baseline="-25000" dirty="0" smtClean="0"/>
-                  <a:t>1</a:t>
-                </a:r>
-                <a:endParaRPr lang="en-US" sz="2400" baseline="-25000" dirty="0"/>
-              </a:p>
-            </p:txBody>
-          </p:sp>
-          <p:sp>
-            <p:nvSpPr>
-              <p:cNvPr id="13" name="TextBox 12"/>
-              <p:cNvSpPr txBox="1"/>
-              <p:nvPr/>
-            </p:nvSpPr>
-            <p:spPr>
-              <a:xfrm>
-                <a:off x="3131349" y="3109887"/>
-                <a:ext cx="1240544" cy="461665"/>
-              </a:xfrm>
-              <a:prstGeom prst="rect">
-                <a:avLst/>
-              </a:prstGeom>
-              <a:noFill/>
-            </p:spPr>
-            <p:txBody>
-              <a:bodyPr wrap="none" rtlCol="0">
-                <a:spAutoFit/>
-              </a:bodyPr>
-              <a:lstStyle/>
-              <a:p>
-                <a:r>
-                  <a:rPr lang="en-US" sz="2400" b="1" dirty="0" smtClean="0"/>
-                  <a:t>E</a:t>
-                </a:r>
-                <a:r>
-                  <a:rPr lang="en-US" sz="2400" baseline="-25000" dirty="0"/>
-                  <a:t>2</a:t>
-                </a:r>
-                <a:r>
-                  <a:rPr lang="en-US" sz="2400" b="1" dirty="0" smtClean="0"/>
-                  <a:t>, D</a:t>
-                </a:r>
-                <a:r>
-                  <a:rPr lang="en-US" sz="2400" baseline="-25000" dirty="0"/>
-                  <a:t>2</a:t>
-                </a:r>
-                <a:r>
-                  <a:rPr lang="en-US" sz="2400" b="1" dirty="0" smtClean="0"/>
-                  <a:t>, J</a:t>
-                </a:r>
-                <a:r>
-                  <a:rPr lang="en-US" sz="2400" baseline="-25000" dirty="0"/>
-                  <a:t>2</a:t>
-                </a:r>
-              </a:p>
-            </p:txBody>
-          </p:sp>
-        </p:grpSp>
-        <p:sp>
-          <p:nvSpPr>
-            <p:cNvPr id="14" name="TextBox 13"/>
-            <p:cNvSpPr txBox="1"/>
-            <p:nvPr/>
-          </p:nvSpPr>
-          <p:spPr>
-            <a:xfrm>
-              <a:off x="347767" y="2328205"/>
-              <a:ext cx="1848859" cy="461665"/>
-            </a:xfrm>
-            <a:prstGeom prst="rect">
-              <a:avLst/>
-            </a:prstGeom>
-            <a:noFill/>
-          </p:spPr>
-          <p:txBody>
-            <a:bodyPr wrap="none" rtlCol="0">
-              <a:spAutoFit/>
-            </a:bodyPr>
-            <a:lstStyle/>
-            <a:p>
-              <a:r>
-                <a:rPr lang="en-US" sz="2000" dirty="0" smtClean="0">
-                  <a:solidFill>
-                    <a:schemeClr val="tx1">
-                      <a:lumMod val="75000"/>
-                      <a:lumOff val="25000"/>
-                    </a:schemeClr>
-                  </a:solidFill>
-                </a:rPr>
-                <a:t>Layer 1:  </a:t>
-              </a:r>
-              <a:r>
-                <a:rPr lang="en-US" sz="2400" dirty="0" smtClean="0">
-                  <a:solidFill>
-                    <a:schemeClr val="tx1">
-                      <a:lumMod val="75000"/>
-                      <a:lumOff val="25000"/>
-                    </a:schemeClr>
-                  </a:solidFill>
-                </a:rPr>
-                <a:t>σ</a:t>
-              </a:r>
-              <a:r>
-                <a:rPr lang="en-US" sz="2400" baseline="-25000" dirty="0" smtClean="0">
-                  <a:solidFill>
-                    <a:schemeClr val="tx1">
-                      <a:lumMod val="75000"/>
-                      <a:lumOff val="25000"/>
-                    </a:schemeClr>
-                  </a:solidFill>
-                </a:rPr>
-                <a:t>1</a:t>
-              </a:r>
-              <a:r>
-                <a:rPr lang="en-US" sz="2400" dirty="0" smtClean="0">
-                  <a:solidFill>
-                    <a:schemeClr val="tx1">
-                      <a:lumMod val="75000"/>
-                      <a:lumOff val="25000"/>
-                    </a:schemeClr>
-                  </a:solidFill>
-                </a:rPr>
-                <a:t> , ε</a:t>
-              </a:r>
-              <a:r>
-                <a:rPr lang="en-US" sz="2400" baseline="-25000" dirty="0" smtClean="0">
-                  <a:solidFill>
-                    <a:schemeClr val="tx1">
-                      <a:lumMod val="75000"/>
-                      <a:lumOff val="25000"/>
-                    </a:schemeClr>
-                  </a:solidFill>
-                </a:rPr>
-                <a:t>1</a:t>
-              </a:r>
-              <a:endParaRPr lang="en-US" sz="2400" baseline="-25000" dirty="0">
+              </a:rPr>
+              <a:t>μ</a:t>
+            </a:r>
+            <a:r>
+              <a:rPr lang="en-US" sz="2400" baseline="-25000" dirty="0" smtClean="0">
                 <a:solidFill>
-                  <a:schemeClr val="tx1">
-                    <a:lumMod val="75000"/>
-                    <a:lumOff val="25000"/>
-                  </a:schemeClr>
+                  <a:srgbClr val="000000"/>
                 </a:solidFill>
-              </a:endParaRPr>
-            </a:p>
-          </p:txBody>
-        </p:sp>
-        <p:sp>
-          <p:nvSpPr>
-            <p:cNvPr id="18" name="TextBox 17"/>
-            <p:cNvSpPr txBox="1"/>
-            <p:nvPr/>
-          </p:nvSpPr>
-          <p:spPr>
-            <a:xfrm>
-              <a:off x="347767" y="3109887"/>
-              <a:ext cx="1848859" cy="461665"/>
-            </a:xfrm>
-            <a:prstGeom prst="rect">
-              <a:avLst/>
-            </a:prstGeom>
-            <a:noFill/>
-          </p:spPr>
-          <p:txBody>
-            <a:bodyPr wrap="none" rtlCol="0">
-              <a:spAutoFit/>
-            </a:bodyPr>
-            <a:lstStyle/>
-            <a:p>
-              <a:r>
-                <a:rPr lang="en-US" sz="2000" dirty="0" smtClean="0">
-                  <a:solidFill>
-                    <a:schemeClr val="tx1">
-                      <a:lumMod val="75000"/>
-                      <a:lumOff val="25000"/>
-                    </a:schemeClr>
-                  </a:solidFill>
-                </a:rPr>
-                <a:t>Layer 2:  </a:t>
-              </a:r>
-              <a:r>
-                <a:rPr lang="en-US" sz="2400" dirty="0" smtClean="0">
-                  <a:solidFill>
-                    <a:schemeClr val="tx1">
-                      <a:lumMod val="75000"/>
-                      <a:lumOff val="25000"/>
-                    </a:schemeClr>
-                  </a:solidFill>
-                </a:rPr>
-                <a:t>σ</a:t>
-              </a:r>
-              <a:r>
-                <a:rPr lang="en-US" sz="2400" baseline="-25000" dirty="0">
-                  <a:solidFill>
-                    <a:schemeClr val="tx1">
-                      <a:lumMod val="75000"/>
-                      <a:lumOff val="25000"/>
-                    </a:schemeClr>
-                  </a:solidFill>
-                </a:rPr>
-                <a:t>2</a:t>
-              </a:r>
-              <a:r>
-                <a:rPr lang="en-US" sz="2400" dirty="0" smtClean="0">
-                  <a:solidFill>
-                    <a:schemeClr val="tx1">
-                      <a:lumMod val="75000"/>
-                      <a:lumOff val="25000"/>
-                    </a:schemeClr>
-                  </a:solidFill>
-                </a:rPr>
-                <a:t> , ε</a:t>
-              </a:r>
-              <a:r>
-                <a:rPr lang="en-US" sz="2400" baseline="-25000" dirty="0">
-                  <a:solidFill>
-                    <a:schemeClr val="tx1">
-                      <a:lumMod val="75000"/>
-                      <a:lumOff val="25000"/>
-                    </a:schemeClr>
-                  </a:solidFill>
-                </a:rPr>
-                <a:t>2</a:t>
-              </a:r>
-            </a:p>
-          </p:txBody>
-        </p:sp>
-      </p:grpSp>
+              </a:rPr>
+              <a:t>2</a:t>
+            </a:r>
+            <a:r>
+              <a:rPr lang="en-US" sz="2400" dirty="0" smtClean="0">
+                <a:solidFill>
+                  <a:srgbClr val="000000"/>
+                </a:solidFill>
+              </a:rPr>
+              <a:t> </a:t>
+            </a:r>
+            <a:r>
+              <a:rPr lang="en-US" sz="2400" dirty="0" smtClean="0">
+                <a:solidFill>
+                  <a:srgbClr val="000000"/>
+                </a:solidFill>
+              </a:rPr>
+              <a:t>, ε</a:t>
+            </a:r>
+            <a:r>
+              <a:rPr lang="en-US" sz="2400" baseline="-25000" dirty="0">
+                <a:solidFill>
+                  <a:srgbClr val="000000"/>
+                </a:solidFill>
+              </a:rPr>
+              <a:t>2</a:t>
+            </a:r>
+          </a:p>
+        </p:txBody>
+      </p:sp>
       <p:graphicFrame>
         <p:nvGraphicFramePr>
           <p:cNvPr id="24" name="Object 23"/>
@@ -3527,7 +3523,7 @@
           <a:graphicData uri="http://schemas.openxmlformats.org/presentationml/2006/ole">
             <mc:AlternateContent xmlns:mc="http://schemas.openxmlformats.org/markup-compatibility/2006">
               <mc:Choice xmlns:v="urn:schemas-microsoft-com:vml" Requires="v">
-                <p:oleObj spid="_x0000_s1029" name="Equation" r:id="rId3" imgW="114300" imgH="165100" progId="Equation.3">
+                <p:oleObj spid="_x0000_s1044" name="Equation" r:id="rId3" imgW="114300" imgH="165100" progId="Equation.3">
                   <p:embed/>
                 </p:oleObj>
               </mc:Choice>
@@ -3570,7 +3566,7 @@
         </p:nvGrpSpPr>
         <p:grpSpPr>
           <a:xfrm>
-            <a:off x="4545090" y="2328205"/>
+            <a:off x="5326424" y="2328205"/>
             <a:ext cx="650173" cy="1087140"/>
             <a:chOff x="4545090" y="2328205"/>
             <a:chExt cx="650173" cy="1087140"/>
@@ -3704,218 +3700,331 @@
                 <a:rPr lang="en-US" sz="2400" b="1" dirty="0"/>
                 <a:t>t</a:t>
               </a:r>
-              <a:endParaRPr lang="en-US" sz="2400" b="1" dirty="0"/>
             </a:p>
           </p:txBody>
         </p:sp>
       </p:grpSp>
+      <p:sp>
+        <p:nvSpPr>
+          <p:cNvPr id="27" name="TextBox 26"/>
+          <p:cNvSpPr txBox="1"/>
+          <p:nvPr/>
+        </p:nvSpPr>
+        <p:spPr>
+          <a:xfrm>
+            <a:off x="3538149" y="3571552"/>
+            <a:ext cx="1692741" cy="461665"/>
+          </a:xfrm>
+          <a:prstGeom prst="rect">
+            <a:avLst/>
+          </a:prstGeom>
+          <a:noFill/>
+        </p:spPr>
+        <p:txBody>
+          <a:bodyPr wrap="none" rtlCol="0">
+            <a:spAutoFit/>
+          </a:bodyPr>
+          <a:lstStyle/>
+          <a:p>
+            <a:r>
+              <a:rPr lang="en-US" sz="2400" b="1" dirty="0" smtClean="0"/>
+              <a:t>b</a:t>
+            </a:r>
+            <a:r>
+              <a:rPr lang="en-US" sz="2400" baseline="-25000" dirty="0" smtClean="0"/>
+              <a:t>2</a:t>
+            </a:r>
+            <a:r>
+              <a:rPr lang="en-US" sz="2400" dirty="0" smtClean="0"/>
+              <a:t>, </a:t>
+            </a:r>
+            <a:r>
+              <a:rPr lang="en-US" sz="2400" b="1" dirty="0" smtClean="0"/>
+              <a:t>d</a:t>
+            </a:r>
+            <a:r>
+              <a:rPr lang="en-US" sz="2400" baseline="-25000" dirty="0" smtClean="0"/>
+              <a:t>2</a:t>
+            </a:r>
+            <a:r>
+              <a:rPr lang="en-US" sz="2400" dirty="0"/>
+              <a:t>,</a:t>
+            </a:r>
+            <a:r>
+              <a:rPr lang="en-US" sz="2400" b="1" dirty="0" smtClean="0"/>
+              <a:t> </a:t>
+            </a:r>
+            <a:r>
+              <a:rPr lang="en-US" sz="2400" b="1" dirty="0"/>
+              <a:t>e</a:t>
+            </a:r>
+            <a:r>
+              <a:rPr lang="en-US" sz="2400" baseline="-25000" dirty="0"/>
+              <a:t>2</a:t>
+            </a:r>
+            <a:r>
+              <a:rPr lang="en-US" sz="2400" dirty="0"/>
+              <a:t>,</a:t>
+            </a:r>
+            <a:r>
+              <a:rPr lang="en-US" sz="2400" b="1" dirty="0"/>
+              <a:t> </a:t>
+            </a:r>
+            <a:r>
+              <a:rPr lang="en-US" sz="2400" b="1" dirty="0" smtClean="0"/>
+              <a:t>h</a:t>
+            </a:r>
+            <a:r>
+              <a:rPr lang="en-US" sz="2400" baseline="-25000" dirty="0" smtClean="0"/>
+              <a:t>2</a:t>
+            </a:r>
+            <a:endParaRPr lang="en-US" sz="2400" b="1" baseline="-25000" dirty="0"/>
+          </a:p>
+        </p:txBody>
+      </p:sp>
+    </p:spTree>
+    <p:extLst>
+      <p:ext uri="{BB962C8B-B14F-4D97-AF65-F5344CB8AC3E}">
+        <p14:creationId xmlns:p14="http://schemas.microsoft.com/office/powerpoint/2010/main" val="4241536918"/>
+      </p:ext>
+    </p:extLst>
+  </p:cSld>
+  <p:clrMapOvr>
+    <a:masterClrMapping/>
+  </p:clrMapOvr>
+</p:sld>
+</file>
+
+<file path=ppt/slides/slide2.xml><?xml version="1.0" encoding="utf-8"?>
+<p:sld xmlns:a="http://schemas.openxmlformats.org/drawingml/2006/main" xmlns:r="http://schemas.openxmlformats.org/officeDocument/2006/relationships" xmlns:p="http://schemas.openxmlformats.org/presentationml/2006/main">
+  <p:cSld>
+    <p:spTree>
+      <p:nvGrpSpPr>
+        <p:cNvPr id="1" name=""/>
+        <p:cNvGrpSpPr/>
+        <p:nvPr/>
+      </p:nvGrpSpPr>
+      <p:grpSpPr>
+        <a:xfrm>
+          <a:off x="0" y="0"/>
+          <a:ext cx="0" cy="0"/>
+          <a:chOff x="0" y="0"/>
+          <a:chExt cx="0" cy="0"/>
+        </a:xfrm>
+      </p:grpSpPr>
       <p:grpSp>
         <p:nvGrpSpPr>
-          <p:cNvPr id="46" name="Group 45"/>
+          <p:cNvPr id="13" name="Group 12"/>
           <p:cNvGrpSpPr/>
           <p:nvPr/>
         </p:nvGrpSpPr>
         <p:grpSpPr>
           <a:xfrm>
-            <a:off x="5503788" y="2075533"/>
-            <a:ext cx="1300346" cy="1162427"/>
-            <a:chOff x="5503788" y="2075533"/>
-            <a:chExt cx="1300346" cy="1162427"/>
+            <a:off x="4361793" y="1576552"/>
+            <a:ext cx="4501931" cy="2621063"/>
+            <a:chOff x="4361793" y="1576552"/>
+            <a:chExt cx="4501931" cy="2621063"/>
           </a:xfrm>
         </p:grpSpPr>
-        <p:grpSp>
-          <p:nvGrpSpPr>
-            <p:cNvPr id="40" name="Group 39"/>
-            <p:cNvGrpSpPr/>
-            <p:nvPr/>
-          </p:nvGrpSpPr>
-          <p:grpSpPr>
-            <a:xfrm>
-              <a:off x="5503788" y="2537198"/>
-              <a:ext cx="1300346" cy="700762"/>
-              <a:chOff x="5503788" y="2537198"/>
-              <a:chExt cx="1300346" cy="700762"/>
-            </a:xfrm>
-          </p:grpSpPr>
-          <p:sp>
-            <p:nvSpPr>
-              <p:cNvPr id="31" name="Rectangle 30"/>
-              <p:cNvSpPr/>
-              <p:nvPr/>
-            </p:nvSpPr>
-            <p:spPr>
-              <a:xfrm>
-                <a:off x="5503788" y="2537198"/>
-                <a:ext cx="1300346" cy="700762"/>
-              </a:xfrm>
-              <a:prstGeom prst="rect">
-                <a:avLst/>
-              </a:prstGeom>
-              <a:solidFill>
-                <a:schemeClr val="accent6">
-                  <a:lumMod val="40000"/>
-                  <a:lumOff val="60000"/>
-                  <a:alpha val="48000"/>
-                </a:schemeClr>
-              </a:solidFill>
-              <a:ln w="28575" cmpd="sng">
-                <a:solidFill>
-                  <a:srgbClr val="FF0000"/>
-                </a:solidFill>
-                <a:prstDash val="sysDash"/>
-              </a:ln>
-              <a:effectLst/>
-            </p:spPr>
-            <p:style>
-              <a:lnRef idx="1">
-                <a:schemeClr val="dk1"/>
-              </a:lnRef>
-              <a:fillRef idx="3">
-                <a:schemeClr val="dk1"/>
-              </a:fillRef>
-              <a:effectRef idx="2">
-                <a:schemeClr val="dk1"/>
-              </a:effectRef>
-              <a:fontRef idx="minor">
-                <a:schemeClr val="lt1"/>
-              </a:fontRef>
-            </p:style>
-            <p:txBody>
-              <a:bodyPr rtlCol="0" anchor="ctr"/>
-              <a:lstStyle/>
-              <a:p>
-                <a:pPr algn="ctr"/>
-                <a:r>
-                  <a:rPr lang="en-US" sz="2800" dirty="0" smtClean="0">
-                    <a:solidFill>
-                      <a:schemeClr val="tx1"/>
-                    </a:solidFill>
-                  </a:rPr>
-                  <a:t>A</a:t>
-                </a:r>
-                <a:endParaRPr lang="en-US" sz="2800" dirty="0">
-                  <a:solidFill>
-                    <a:schemeClr val="tx1"/>
-                  </a:solidFill>
-                </a:endParaRPr>
-              </a:p>
-            </p:txBody>
-          </p:sp>
-          <p:cxnSp>
-            <p:nvCxnSpPr>
-              <p:cNvPr id="34" name="Straight Arrow Connector 33"/>
-              <p:cNvCxnSpPr/>
-              <p:nvPr/>
-            </p:nvCxnSpPr>
-            <p:spPr>
-              <a:xfrm flipH="1">
-                <a:off x="5976597" y="2537198"/>
-                <a:ext cx="276244" cy="0"/>
-              </a:xfrm>
-              <a:prstGeom prst="straightConnector1">
-                <a:avLst/>
-              </a:prstGeom>
-              <a:ln w="38100" cmpd="sng">
-                <a:solidFill>
-                  <a:srgbClr val="000090"/>
-                </a:solidFill>
-                <a:tailEnd type="arrow"/>
-              </a:ln>
-            </p:spPr>
-            <p:style>
-              <a:lnRef idx="2">
-                <a:schemeClr val="accent1"/>
-              </a:lnRef>
-              <a:fillRef idx="0">
-                <a:schemeClr val="accent1"/>
-              </a:fillRef>
-              <a:effectRef idx="1">
-                <a:schemeClr val="accent1"/>
-              </a:effectRef>
-              <a:fontRef idx="minor">
-                <a:schemeClr val="tx1"/>
-              </a:fontRef>
-            </p:style>
-          </p:cxnSp>
-          <p:cxnSp>
-            <p:nvCxnSpPr>
-              <p:cNvPr id="35" name="Straight Arrow Connector 34"/>
-              <p:cNvCxnSpPr/>
-              <p:nvPr/>
-            </p:nvCxnSpPr>
-            <p:spPr>
-              <a:xfrm>
-                <a:off x="5976597" y="3225504"/>
-                <a:ext cx="354728" cy="1444"/>
-              </a:xfrm>
-              <a:prstGeom prst="straightConnector1">
-                <a:avLst/>
-              </a:prstGeom>
-              <a:ln w="38100" cmpd="sng">
-                <a:solidFill>
-                  <a:srgbClr val="000090"/>
-                </a:solidFill>
-                <a:tailEnd type="arrow"/>
-              </a:ln>
-            </p:spPr>
-            <p:style>
-              <a:lnRef idx="2">
-                <a:schemeClr val="accent1"/>
-              </a:lnRef>
-              <a:fillRef idx="0">
-                <a:schemeClr val="accent1"/>
-              </a:fillRef>
-              <a:effectRef idx="1">
-                <a:schemeClr val="accent1"/>
-              </a:effectRef>
-              <a:fontRef idx="minor">
-                <a:schemeClr val="tx1"/>
-              </a:fontRef>
-            </p:style>
-          </p:cxnSp>
-        </p:grpSp>
         <p:sp>
           <p:nvSpPr>
-            <p:cNvPr id="41" name="TextBox 40"/>
-            <p:cNvSpPr txBox="1"/>
+            <p:cNvPr id="36" name="Rectangle 35"/>
+            <p:cNvSpPr/>
             <p:nvPr/>
           </p:nvSpPr>
           <p:spPr>
             <a:xfrm>
-              <a:off x="5503788" y="2075533"/>
-              <a:ext cx="348773" cy="461665"/>
+              <a:off x="4361793" y="2887579"/>
+              <a:ext cx="4501931" cy="1310036"/>
             </a:xfrm>
             <a:prstGeom prst="rect">
               <a:avLst/>
             </a:prstGeom>
-            <a:noFill/>
+            <a:solidFill>
+              <a:schemeClr val="tx2">
+                <a:lumMod val="75000"/>
+                <a:alpha val="23000"/>
+              </a:schemeClr>
+            </a:solidFill>
+            <a:ln>
+              <a:noFill/>
+            </a:ln>
           </p:spPr>
+          <p:style>
+            <a:lnRef idx="1">
+              <a:schemeClr val="accent1"/>
+            </a:lnRef>
+            <a:fillRef idx="3">
+              <a:schemeClr val="accent1"/>
+            </a:fillRef>
+            <a:effectRef idx="2">
+              <a:schemeClr val="accent1"/>
+            </a:effectRef>
+            <a:fontRef idx="minor">
+              <a:schemeClr val="lt1"/>
+            </a:fontRef>
+          </p:style>
           <p:txBody>
-            <a:bodyPr wrap="none" rtlCol="0">
-              <a:spAutoFit/>
-            </a:bodyPr>
+            <a:bodyPr rtlCol="0" anchor="ctr"/>
             <a:lstStyle/>
             <a:p>
-              <a:r>
-                <a:rPr lang="en-US" sz="2400" dirty="0"/>
-                <a:t>C</a:t>
-              </a:r>
+              <a:pPr algn="ctr"/>
+              <a:endParaRPr lang="en-US"/>
+            </a:p>
+          </p:txBody>
+        </p:sp>
+        <p:sp>
+          <p:nvSpPr>
+            <p:cNvPr id="6" name="Rectangle 5"/>
+            <p:cNvSpPr/>
+            <p:nvPr/>
+          </p:nvSpPr>
+          <p:spPr>
+            <a:xfrm>
+              <a:off x="4361793" y="1576552"/>
+              <a:ext cx="4501931" cy="1310036"/>
+            </a:xfrm>
+            <a:prstGeom prst="rect">
+              <a:avLst/>
+            </a:prstGeom>
+            <a:solidFill>
+              <a:schemeClr val="accent2">
+                <a:lumMod val="75000"/>
+                <a:alpha val="32000"/>
+              </a:schemeClr>
+            </a:solidFill>
+            <a:ln>
+              <a:noFill/>
+            </a:ln>
+          </p:spPr>
+          <p:style>
+            <a:lnRef idx="1">
+              <a:schemeClr val="accent1"/>
+            </a:lnRef>
+            <a:fillRef idx="3">
+              <a:schemeClr val="accent1"/>
+            </a:fillRef>
+            <a:effectRef idx="2">
+              <a:schemeClr val="accent1"/>
+            </a:effectRef>
+            <a:fontRef idx="minor">
+              <a:schemeClr val="lt1"/>
+            </a:fontRef>
+          </p:style>
+          <p:txBody>
+            <a:bodyPr rtlCol="0" anchor="ctr"/>
+            <a:lstStyle/>
+            <a:p>
+              <a:pPr algn="ctr"/>
+              <a:endParaRPr lang="en-US"/>
             </a:p>
           </p:txBody>
         </p:sp>
       </p:grpSp>
+      <p:cxnSp>
+        <p:nvCxnSpPr>
+          <p:cNvPr id="7" name="Straight Connector 6"/>
+          <p:cNvCxnSpPr/>
+          <p:nvPr/>
+        </p:nvCxnSpPr>
+        <p:spPr>
+          <a:xfrm>
+            <a:off x="4361793" y="2886588"/>
+            <a:ext cx="4501931" cy="0"/>
+          </a:xfrm>
+          <a:prstGeom prst="line">
+            <a:avLst/>
+          </a:prstGeom>
+          <a:ln w="38100" cmpd="sng">
+            <a:solidFill>
+              <a:schemeClr val="tx1"/>
+            </a:solidFill>
+          </a:ln>
+        </p:spPr>
+        <p:style>
+          <a:lnRef idx="2">
+            <a:schemeClr val="accent1"/>
+          </a:lnRef>
+          <a:fillRef idx="0">
+            <a:schemeClr val="accent1"/>
+          </a:fillRef>
+          <a:effectRef idx="1">
+            <a:schemeClr val="accent1"/>
+          </a:effectRef>
+          <a:fontRef idx="minor">
+            <a:schemeClr val="tx1"/>
+          </a:fontRef>
+        </p:style>
+      </p:cxnSp>
+      <p:graphicFrame>
+        <p:nvGraphicFramePr>
+          <p:cNvPr id="24" name="Object 23"/>
+          <p:cNvGraphicFramePr>
+            <a:graphicFrameLocks noChangeAspect="1"/>
+          </p:cNvGraphicFramePr>
+          <p:nvPr>
+            <p:extLst>
+              <p:ext uri="{D42A27DB-BD31-4B8C-83A1-F6EECF244321}">
+                <p14:modId xmlns:p14="http://schemas.microsoft.com/office/powerpoint/2010/main" val="1920136441"/>
+              </p:ext>
+            </p:extLst>
+          </p:nvPr>
+        </p:nvGraphicFramePr>
+        <p:xfrm>
+          <a:off x="4514850" y="3346450"/>
+          <a:ext cx="114300" cy="165100"/>
+        </p:xfrm>
+        <a:graphic>
+          <a:graphicData uri="http://schemas.openxmlformats.org/presentationml/2006/ole">
+            <mc:AlternateContent xmlns:mc="http://schemas.openxmlformats.org/markup-compatibility/2006">
+              <mc:Choice xmlns:v="urn:schemas-microsoft-com:vml" Requires="v">
+                <p:oleObj spid="_x0000_s2063" name="Equation" r:id="rId3" imgW="114300" imgH="165100" progId="Equation.3">
+                  <p:embed/>
+                </p:oleObj>
+              </mc:Choice>
+              <mc:Fallback>
+                <p:oleObj name="Equation" r:id="rId3" imgW="114300" imgH="165100" progId="Equation.3">
+                  <p:embed/>
+                  <p:pic>
+                    <p:nvPicPr>
+                      <p:cNvPr id="0" name=""/>
+                      <p:cNvPicPr/>
+                      <p:nvPr/>
+                    </p:nvPicPr>
+                    <p:blipFill>
+                      <a:blip r:embed="rId4"/>
+                      <a:stretch>
+                        <a:fillRect/>
+                      </a:stretch>
+                    </p:blipFill>
+                    <p:spPr>
+                      <a:xfrm>
+                        <a:off x="4514850" y="3346450"/>
+                        <a:ext cx="114300" cy="165100"/>
+                      </a:xfrm>
+                      <a:prstGeom prst="rect">
+                        <a:avLst/>
+                      </a:prstGeom>
+                    </p:spPr>
+                  </p:pic>
+                </p:oleObj>
+              </mc:Fallback>
+            </mc:AlternateContent>
+          </a:graphicData>
+        </a:graphic>
+      </p:graphicFrame>
       <p:grpSp>
         <p:nvGrpSpPr>
-          <p:cNvPr id="45" name="Group 44"/>
+          <p:cNvPr id="15" name="Group 14"/>
           <p:cNvGrpSpPr/>
           <p:nvPr/>
         </p:nvGrpSpPr>
         <p:grpSpPr>
           <a:xfrm>
-            <a:off x="7303104" y="2097372"/>
-            <a:ext cx="1285226" cy="1173208"/>
-            <a:chOff x="7303104" y="2064752"/>
-            <a:chExt cx="1285226" cy="1173208"/>
+            <a:off x="5612691" y="1937138"/>
+            <a:ext cx="2725516" cy="1346634"/>
+            <a:chOff x="5612691" y="1937138"/>
+            <a:chExt cx="2725516" cy="1346634"/>
           </a:xfrm>
         </p:grpSpPr>
         <p:sp>
@@ -3926,16 +4035,15 @@
           </p:nvSpPr>
           <p:spPr>
             <a:xfrm>
-              <a:off x="7303104" y="2537198"/>
-              <a:ext cx="1285226" cy="700762"/>
+              <a:off x="5612691" y="2396781"/>
+              <a:ext cx="2725516" cy="886991"/>
             </a:xfrm>
             <a:prstGeom prst="can">
               <a:avLst/>
             </a:prstGeom>
             <a:solidFill>
               <a:schemeClr val="accent3">
-                <a:lumMod val="75000"/>
-                <a:alpha val="27000"/>
+                <a:lumMod val="50000"/>
               </a:schemeClr>
             </a:solidFill>
             <a:ln w="28575" cmpd="sng">
@@ -3988,8 +4096,707 @@
           </p:nvCxnSpPr>
           <p:spPr>
             <a:xfrm flipV="1">
-              <a:off x="7930213" y="2097372"/>
-              <a:ext cx="0" cy="461665"/>
+              <a:off x="6942570" y="1937138"/>
+              <a:ext cx="0" cy="584354"/>
+            </a:xfrm>
+            <a:prstGeom prst="straightConnector1">
+              <a:avLst/>
+            </a:prstGeom>
+            <a:solidFill>
+              <a:schemeClr val="accent3">
+                <a:lumMod val="50000"/>
+              </a:schemeClr>
+            </a:solidFill>
+            <a:ln w="38100" cmpd="sng">
+              <a:solidFill>
+                <a:srgbClr val="000090"/>
+              </a:solidFill>
+              <a:tailEnd type="arrow"/>
+            </a:ln>
+          </p:spPr>
+          <p:style>
+            <a:lnRef idx="2">
+              <a:schemeClr val="accent1"/>
+            </a:lnRef>
+            <a:fillRef idx="0">
+              <a:schemeClr val="accent1"/>
+            </a:fillRef>
+            <a:effectRef idx="1">
+              <a:schemeClr val="accent1"/>
+            </a:effectRef>
+            <a:fontRef idx="minor">
+              <a:schemeClr val="tx1"/>
+            </a:fontRef>
+          </p:style>
+        </p:cxnSp>
+      </p:grpSp>
+      <p:sp>
+        <p:nvSpPr>
+          <p:cNvPr id="44" name="TextBox 43"/>
+          <p:cNvSpPr txBox="1"/>
+          <p:nvPr/>
+        </p:nvSpPr>
+        <p:spPr>
+          <a:xfrm>
+            <a:off x="6221675" y="2029613"/>
+            <a:ext cx="326082" cy="461666"/>
+          </a:xfrm>
+          <a:prstGeom prst="rect">
+            <a:avLst/>
+          </a:prstGeom>
+          <a:noFill/>
+        </p:spPr>
+        <p:txBody>
+          <a:bodyPr wrap="none" rtlCol="0">
+            <a:spAutoFit/>
+          </a:bodyPr>
+          <a:lstStyle/>
+          <a:p>
+            <a:r>
+              <a:rPr lang="en-US" sz="2400" dirty="0" smtClean="0"/>
+              <a:t>S</a:t>
+            </a:r>
+            <a:endParaRPr lang="en-US" sz="2400" dirty="0"/>
+          </a:p>
+        </p:txBody>
+      </p:sp>
+      <p:sp>
+        <p:nvSpPr>
+          <p:cNvPr id="28" name="TextBox 27"/>
+          <p:cNvSpPr txBox="1"/>
+          <p:nvPr/>
+        </p:nvSpPr>
+        <p:spPr>
+          <a:xfrm>
+            <a:off x="6945818" y="1844947"/>
+            <a:ext cx="362875" cy="369332"/>
+          </a:xfrm>
+          <a:prstGeom prst="rect">
+            <a:avLst/>
+          </a:prstGeom>
+          <a:noFill/>
+        </p:spPr>
+        <p:txBody>
+          <a:bodyPr wrap="none" rtlCol="0">
+            <a:spAutoFit/>
+          </a:bodyPr>
+          <a:lstStyle/>
+          <a:p>
+            <a:r>
+              <a:rPr lang="en-US" b="1" i="1" dirty="0" smtClean="0"/>
+              <a:t>n</a:t>
+            </a:r>
+            <a:endParaRPr lang="en-US" b="1" i="1" dirty="0"/>
+          </a:p>
+        </p:txBody>
+      </p:sp>
+      <p:sp>
+        <p:nvSpPr>
+          <p:cNvPr id="3" name="TextBox 2"/>
+          <p:cNvSpPr txBox="1"/>
+          <p:nvPr/>
+        </p:nvSpPr>
+        <p:spPr>
+          <a:xfrm>
+            <a:off x="4903338" y="2414335"/>
+            <a:ext cx="462211" cy="307777"/>
+          </a:xfrm>
+          <a:prstGeom prst="rect">
+            <a:avLst/>
+          </a:prstGeom>
+          <a:noFill/>
+        </p:spPr>
+        <p:txBody>
+          <a:bodyPr wrap="none" rtlCol="0">
+            <a:spAutoFit/>
+          </a:bodyPr>
+          <a:lstStyle/>
+          <a:p>
+            <a:r>
+              <a:rPr lang="en-US" sz="1400" i="1" dirty="0" smtClean="0">
+                <a:latin typeface="Times"/>
+                <a:cs typeface="Times"/>
+              </a:rPr>
+              <a:t>h/2</a:t>
+            </a:r>
+            <a:endParaRPr lang="en-US" sz="1400" i="1" dirty="0">
+              <a:latin typeface="Times"/>
+              <a:cs typeface="Times"/>
+            </a:endParaRPr>
+          </a:p>
+        </p:txBody>
+      </p:sp>
+      <p:cxnSp>
+        <p:nvCxnSpPr>
+          <p:cNvPr id="5" name="Straight Arrow Connector 4"/>
+          <p:cNvCxnSpPr/>
+          <p:nvPr/>
+        </p:nvCxnSpPr>
+        <p:spPr>
+          <a:xfrm>
+            <a:off x="5474138" y="2491279"/>
+            <a:ext cx="0" cy="688100"/>
+          </a:xfrm>
+          <a:prstGeom prst="straightConnector1">
+            <a:avLst/>
+          </a:prstGeom>
+          <a:ln>
+            <a:solidFill>
+              <a:schemeClr val="tx1">
+                <a:lumMod val="85000"/>
+                <a:lumOff val="15000"/>
+              </a:schemeClr>
+            </a:solidFill>
+            <a:headEnd type="arrow"/>
+            <a:tailEnd type="arrow"/>
+          </a:ln>
+        </p:spPr>
+        <p:style>
+          <a:lnRef idx="2">
+            <a:schemeClr val="accent1"/>
+          </a:lnRef>
+          <a:fillRef idx="0">
+            <a:schemeClr val="accent1"/>
+          </a:fillRef>
+          <a:effectRef idx="1">
+            <a:schemeClr val="accent1"/>
+          </a:effectRef>
+          <a:fontRef idx="minor">
+            <a:schemeClr val="tx1"/>
+          </a:fontRef>
+        </p:style>
+      </p:cxnSp>
+      <p:sp>
+        <p:nvSpPr>
+          <p:cNvPr id="37" name="TextBox 36"/>
+          <p:cNvSpPr txBox="1"/>
+          <p:nvPr/>
+        </p:nvSpPr>
+        <p:spPr>
+          <a:xfrm>
+            <a:off x="4843551" y="3025490"/>
+            <a:ext cx="521998" cy="307777"/>
+          </a:xfrm>
+          <a:prstGeom prst="rect">
+            <a:avLst/>
+          </a:prstGeom>
+          <a:noFill/>
+        </p:spPr>
+        <p:txBody>
+          <a:bodyPr wrap="none" rtlCol="0">
+            <a:spAutoFit/>
+          </a:bodyPr>
+          <a:lstStyle/>
+          <a:p>
+            <a:r>
+              <a:rPr lang="en-US" sz="1400" i="1" dirty="0" smtClean="0">
+                <a:latin typeface="Times"/>
+                <a:cs typeface="Times"/>
+              </a:rPr>
+              <a:t>-h/2</a:t>
+            </a:r>
+            <a:endParaRPr lang="en-US" sz="1400" i="1" dirty="0">
+              <a:latin typeface="Times"/>
+              <a:cs typeface="Times"/>
+            </a:endParaRPr>
+          </a:p>
+        </p:txBody>
+      </p:sp>
+      <p:sp>
+        <p:nvSpPr>
+          <p:cNvPr id="17" name="TextBox 16"/>
+          <p:cNvSpPr txBox="1"/>
+          <p:nvPr/>
+        </p:nvSpPr>
+        <p:spPr>
+          <a:xfrm>
+            <a:off x="2715172" y="5080000"/>
+            <a:ext cx="2877711" cy="369332"/>
+          </a:xfrm>
+          <a:prstGeom prst="rect">
+            <a:avLst/>
+          </a:prstGeom>
+          <a:noFill/>
+        </p:spPr>
+        <p:txBody>
+          <a:bodyPr wrap="none" rtlCol="0">
+            <a:spAutoFit/>
+          </a:bodyPr>
+          <a:lstStyle/>
+          <a:p>
+            <a:r>
+              <a:rPr lang="en-US" dirty="0" smtClean="0"/>
+              <a:t>Boundary conditions for D, B</a:t>
+            </a:r>
+            <a:endParaRPr lang="en-US" dirty="0"/>
+          </a:p>
+        </p:txBody>
+      </p:sp>
+    </p:spTree>
+    <p:extLst>
+      <p:ext uri="{BB962C8B-B14F-4D97-AF65-F5344CB8AC3E}">
+        <p14:creationId xmlns:p14="http://schemas.microsoft.com/office/powerpoint/2010/main" val="339854367"/>
+      </p:ext>
+    </p:extLst>
+  </p:cSld>
+  <p:clrMapOvr>
+    <a:masterClrMapping/>
+  </p:clrMapOvr>
+</p:sld>
+</file>
+
+<file path=ppt/slides/slide3.xml><?xml version="1.0" encoding="utf-8"?>
+<p:sld xmlns:a="http://schemas.openxmlformats.org/drawingml/2006/main" xmlns:r="http://schemas.openxmlformats.org/officeDocument/2006/relationships" xmlns:p="http://schemas.openxmlformats.org/presentationml/2006/main">
+  <p:cSld>
+    <p:spTree>
+      <p:nvGrpSpPr>
+        <p:cNvPr id="1" name=""/>
+        <p:cNvGrpSpPr/>
+        <p:nvPr/>
+      </p:nvGrpSpPr>
+      <p:grpSpPr>
+        <a:xfrm>
+          <a:off x="0" y="0"/>
+          <a:ext cx="0" cy="0"/>
+          <a:chOff x="0" y="0"/>
+          <a:chExt cx="0" cy="0"/>
+        </a:xfrm>
+      </p:grpSpPr>
+      <p:grpSp>
+        <p:nvGrpSpPr>
+          <p:cNvPr id="13" name="Group 12"/>
+          <p:cNvGrpSpPr/>
+          <p:nvPr/>
+        </p:nvGrpSpPr>
+        <p:grpSpPr>
+          <a:xfrm>
+            <a:off x="4361793" y="1576552"/>
+            <a:ext cx="4501931" cy="2621063"/>
+            <a:chOff x="4361793" y="1576552"/>
+            <a:chExt cx="4501931" cy="2621063"/>
+          </a:xfrm>
+        </p:grpSpPr>
+        <p:sp>
+          <p:nvSpPr>
+            <p:cNvPr id="36" name="Rectangle 35"/>
+            <p:cNvSpPr/>
+            <p:nvPr/>
+          </p:nvSpPr>
+          <p:spPr>
+            <a:xfrm>
+              <a:off x="4361793" y="2887579"/>
+              <a:ext cx="4501931" cy="1310036"/>
+            </a:xfrm>
+            <a:prstGeom prst="rect">
+              <a:avLst/>
+            </a:prstGeom>
+            <a:solidFill>
+              <a:schemeClr val="tx2">
+                <a:lumMod val="75000"/>
+                <a:alpha val="23000"/>
+              </a:schemeClr>
+            </a:solidFill>
+            <a:ln>
+              <a:noFill/>
+            </a:ln>
+          </p:spPr>
+          <p:style>
+            <a:lnRef idx="1">
+              <a:schemeClr val="accent1"/>
+            </a:lnRef>
+            <a:fillRef idx="3">
+              <a:schemeClr val="accent1"/>
+            </a:fillRef>
+            <a:effectRef idx="2">
+              <a:schemeClr val="accent1"/>
+            </a:effectRef>
+            <a:fontRef idx="minor">
+              <a:schemeClr val="lt1"/>
+            </a:fontRef>
+          </p:style>
+          <p:txBody>
+            <a:bodyPr rtlCol="0" anchor="ctr"/>
+            <a:lstStyle/>
+            <a:p>
+              <a:pPr algn="ctr"/>
+              <a:endParaRPr lang="en-US"/>
+            </a:p>
+          </p:txBody>
+        </p:sp>
+        <p:sp>
+          <p:nvSpPr>
+            <p:cNvPr id="6" name="Rectangle 5"/>
+            <p:cNvSpPr/>
+            <p:nvPr/>
+          </p:nvSpPr>
+          <p:spPr>
+            <a:xfrm>
+              <a:off x="4361793" y="1576552"/>
+              <a:ext cx="4501931" cy="1310036"/>
+            </a:xfrm>
+            <a:prstGeom prst="rect">
+              <a:avLst/>
+            </a:prstGeom>
+            <a:solidFill>
+              <a:schemeClr val="accent2">
+                <a:lumMod val="75000"/>
+                <a:alpha val="32000"/>
+              </a:schemeClr>
+            </a:solidFill>
+            <a:ln>
+              <a:noFill/>
+            </a:ln>
+          </p:spPr>
+          <p:style>
+            <a:lnRef idx="1">
+              <a:schemeClr val="accent1"/>
+            </a:lnRef>
+            <a:fillRef idx="3">
+              <a:schemeClr val="accent1"/>
+            </a:fillRef>
+            <a:effectRef idx="2">
+              <a:schemeClr val="accent1"/>
+            </a:effectRef>
+            <a:fontRef idx="minor">
+              <a:schemeClr val="lt1"/>
+            </a:fontRef>
+          </p:style>
+          <p:txBody>
+            <a:bodyPr rtlCol="0" anchor="ctr"/>
+            <a:lstStyle/>
+            <a:p>
+              <a:pPr algn="ctr"/>
+              <a:endParaRPr lang="en-US" b="1" dirty="0">
+                <a:solidFill>
+                  <a:srgbClr val="000000"/>
+                </a:solidFill>
+              </a:endParaRPr>
+            </a:p>
+          </p:txBody>
+        </p:sp>
+      </p:grpSp>
+      <p:cxnSp>
+        <p:nvCxnSpPr>
+          <p:cNvPr id="7" name="Straight Connector 6"/>
+          <p:cNvCxnSpPr/>
+          <p:nvPr/>
+        </p:nvCxnSpPr>
+        <p:spPr>
+          <a:xfrm>
+            <a:off x="4361793" y="2886588"/>
+            <a:ext cx="4501931" cy="0"/>
+          </a:xfrm>
+          <a:prstGeom prst="line">
+            <a:avLst/>
+          </a:prstGeom>
+          <a:ln w="38100" cmpd="sng">
+            <a:solidFill>
+              <a:schemeClr val="tx1"/>
+            </a:solidFill>
+          </a:ln>
+        </p:spPr>
+        <p:style>
+          <a:lnRef idx="2">
+            <a:schemeClr val="accent1"/>
+          </a:lnRef>
+          <a:fillRef idx="0">
+            <a:schemeClr val="accent1"/>
+          </a:fillRef>
+          <a:effectRef idx="1">
+            <a:schemeClr val="accent1"/>
+          </a:effectRef>
+          <a:fontRef idx="minor">
+            <a:schemeClr val="tx1"/>
+          </a:fontRef>
+        </p:style>
+      </p:cxnSp>
+      <p:graphicFrame>
+        <p:nvGraphicFramePr>
+          <p:cNvPr id="24" name="Object 23"/>
+          <p:cNvGraphicFramePr>
+            <a:graphicFrameLocks noChangeAspect="1"/>
+          </p:cNvGraphicFramePr>
+          <p:nvPr>
+            <p:extLst>
+              <p:ext uri="{D42A27DB-BD31-4B8C-83A1-F6EECF244321}">
+                <p14:modId xmlns:p14="http://schemas.microsoft.com/office/powerpoint/2010/main" val="3933630039"/>
+              </p:ext>
+            </p:extLst>
+          </p:nvPr>
+        </p:nvGraphicFramePr>
+        <p:xfrm>
+          <a:off x="4514850" y="3346450"/>
+          <a:ext cx="114300" cy="165100"/>
+        </p:xfrm>
+        <a:graphic>
+          <a:graphicData uri="http://schemas.openxmlformats.org/presentationml/2006/ole">
+            <mc:AlternateContent xmlns:mc="http://schemas.openxmlformats.org/markup-compatibility/2006">
+              <mc:Choice xmlns:v="urn:schemas-microsoft-com:vml" Requires="v">
+                <p:oleObj spid="_x0000_s4103" name="Equation" r:id="rId3" imgW="114300" imgH="165100" progId="Equation.3">
+                  <p:embed/>
+                </p:oleObj>
+              </mc:Choice>
+              <mc:Fallback>
+                <p:oleObj name="Equation" r:id="rId3" imgW="114300" imgH="165100" progId="Equation.3">
+                  <p:embed/>
+                  <p:pic>
+                    <p:nvPicPr>
+                      <p:cNvPr id="0" name=""/>
+                      <p:cNvPicPr/>
+                      <p:nvPr/>
+                    </p:nvPicPr>
+                    <p:blipFill>
+                      <a:blip r:embed="rId4"/>
+                      <a:stretch>
+                        <a:fillRect/>
+                      </a:stretch>
+                    </p:blipFill>
+                    <p:spPr>
+                      <a:xfrm>
+                        <a:off x="4514850" y="3346450"/>
+                        <a:ext cx="114300" cy="165100"/>
+                      </a:xfrm>
+                      <a:prstGeom prst="rect">
+                        <a:avLst/>
+                      </a:prstGeom>
+                    </p:spPr>
+                  </p:pic>
+                </p:oleObj>
+              </mc:Fallback>
+            </mc:AlternateContent>
+          </a:graphicData>
+        </a:graphic>
+      </p:graphicFrame>
+      <p:sp>
+        <p:nvSpPr>
+          <p:cNvPr id="3" name="TextBox 2"/>
+          <p:cNvSpPr txBox="1"/>
+          <p:nvPr/>
+        </p:nvSpPr>
+        <p:spPr>
+          <a:xfrm>
+            <a:off x="4903338" y="2414335"/>
+            <a:ext cx="462211" cy="307777"/>
+          </a:xfrm>
+          <a:prstGeom prst="rect">
+            <a:avLst/>
+          </a:prstGeom>
+          <a:noFill/>
+        </p:spPr>
+        <p:txBody>
+          <a:bodyPr wrap="none" rtlCol="0">
+            <a:spAutoFit/>
+          </a:bodyPr>
+          <a:lstStyle/>
+          <a:p>
+            <a:r>
+              <a:rPr lang="en-US" sz="1400" i="1" dirty="0" smtClean="0">
+                <a:latin typeface="Times"/>
+                <a:cs typeface="Times"/>
+              </a:rPr>
+              <a:t>h/2</a:t>
+            </a:r>
+            <a:endParaRPr lang="en-US" sz="1400" i="1" dirty="0">
+              <a:latin typeface="Times"/>
+              <a:cs typeface="Times"/>
+            </a:endParaRPr>
+          </a:p>
+        </p:txBody>
+      </p:sp>
+      <p:cxnSp>
+        <p:nvCxnSpPr>
+          <p:cNvPr id="5" name="Straight Arrow Connector 4"/>
+          <p:cNvCxnSpPr/>
+          <p:nvPr/>
+        </p:nvCxnSpPr>
+        <p:spPr>
+          <a:xfrm>
+            <a:off x="5474138" y="2491279"/>
+            <a:ext cx="0" cy="688100"/>
+          </a:xfrm>
+          <a:prstGeom prst="straightConnector1">
+            <a:avLst/>
+          </a:prstGeom>
+          <a:ln>
+            <a:solidFill>
+              <a:schemeClr val="tx1">
+                <a:lumMod val="85000"/>
+                <a:lumOff val="15000"/>
+              </a:schemeClr>
+            </a:solidFill>
+            <a:headEnd type="arrow"/>
+            <a:tailEnd type="arrow"/>
+          </a:ln>
+        </p:spPr>
+        <p:style>
+          <a:lnRef idx="2">
+            <a:schemeClr val="accent1"/>
+          </a:lnRef>
+          <a:fillRef idx="0">
+            <a:schemeClr val="accent1"/>
+          </a:fillRef>
+          <a:effectRef idx="1">
+            <a:schemeClr val="accent1"/>
+          </a:effectRef>
+          <a:fontRef idx="minor">
+            <a:schemeClr val="tx1"/>
+          </a:fontRef>
+        </p:style>
+      </p:cxnSp>
+      <p:sp>
+        <p:nvSpPr>
+          <p:cNvPr id="37" name="TextBox 36"/>
+          <p:cNvSpPr txBox="1"/>
+          <p:nvPr/>
+        </p:nvSpPr>
+        <p:spPr>
+          <a:xfrm>
+            <a:off x="4843551" y="3025490"/>
+            <a:ext cx="521998" cy="307777"/>
+          </a:xfrm>
+          <a:prstGeom prst="rect">
+            <a:avLst/>
+          </a:prstGeom>
+          <a:noFill/>
+        </p:spPr>
+        <p:txBody>
+          <a:bodyPr wrap="none" rtlCol="0">
+            <a:spAutoFit/>
+          </a:bodyPr>
+          <a:lstStyle/>
+          <a:p>
+            <a:r>
+              <a:rPr lang="en-US" sz="1400" i="1" dirty="0" smtClean="0">
+                <a:latin typeface="Times"/>
+                <a:cs typeface="Times"/>
+              </a:rPr>
+              <a:t>-h/2</a:t>
+            </a:r>
+            <a:endParaRPr lang="en-US" sz="1400" i="1" dirty="0">
+              <a:latin typeface="Times"/>
+              <a:cs typeface="Times"/>
+            </a:endParaRPr>
+          </a:p>
+        </p:txBody>
+      </p:sp>
+      <p:sp>
+        <p:nvSpPr>
+          <p:cNvPr id="17" name="TextBox 16"/>
+          <p:cNvSpPr txBox="1"/>
+          <p:nvPr/>
+        </p:nvSpPr>
+        <p:spPr>
+          <a:xfrm>
+            <a:off x="2715172" y="5080000"/>
+            <a:ext cx="2863584" cy="369332"/>
+          </a:xfrm>
+          <a:prstGeom prst="rect">
+            <a:avLst/>
+          </a:prstGeom>
+          <a:noFill/>
+        </p:spPr>
+        <p:txBody>
+          <a:bodyPr wrap="none" rtlCol="0">
+            <a:spAutoFit/>
+          </a:bodyPr>
+          <a:lstStyle/>
+          <a:p>
+            <a:r>
+              <a:rPr lang="en-US" dirty="0" smtClean="0"/>
+              <a:t>Boundary conditions for E, H</a:t>
+            </a:r>
+            <a:endParaRPr lang="en-US" dirty="0"/>
+          </a:p>
+        </p:txBody>
+      </p:sp>
+      <p:grpSp>
+        <p:nvGrpSpPr>
+          <p:cNvPr id="18" name="Group 17"/>
+          <p:cNvGrpSpPr/>
+          <p:nvPr/>
+        </p:nvGrpSpPr>
+        <p:grpSpPr>
+          <a:xfrm>
+            <a:off x="5819597" y="2476550"/>
+            <a:ext cx="2571161" cy="702829"/>
+            <a:chOff x="5503788" y="2537198"/>
+            <a:chExt cx="1300346" cy="700762"/>
+          </a:xfrm>
+        </p:grpSpPr>
+        <p:sp>
+          <p:nvSpPr>
+            <p:cNvPr id="20" name="Rectangle 19"/>
+            <p:cNvSpPr/>
+            <p:nvPr/>
+          </p:nvSpPr>
+          <p:spPr>
+            <a:xfrm>
+              <a:off x="5503788" y="2537198"/>
+              <a:ext cx="1300346" cy="700762"/>
+            </a:xfrm>
+            <a:prstGeom prst="rect">
+              <a:avLst/>
+            </a:prstGeom>
+            <a:solidFill>
+              <a:schemeClr val="accent6">
+                <a:lumMod val="40000"/>
+                <a:lumOff val="60000"/>
+                <a:alpha val="48000"/>
+              </a:schemeClr>
+            </a:solidFill>
+            <a:ln w="28575" cmpd="sng">
+              <a:solidFill>
+                <a:srgbClr val="FF0000"/>
+              </a:solidFill>
+              <a:prstDash val="sysDash"/>
+            </a:ln>
+            <a:effectLst/>
+          </p:spPr>
+          <p:style>
+            <a:lnRef idx="1">
+              <a:schemeClr val="dk1"/>
+            </a:lnRef>
+            <a:fillRef idx="3">
+              <a:schemeClr val="dk1"/>
+            </a:fillRef>
+            <a:effectRef idx="2">
+              <a:schemeClr val="dk1"/>
+            </a:effectRef>
+            <a:fontRef idx="minor">
+              <a:schemeClr val="lt1"/>
+            </a:fontRef>
+          </p:style>
+          <p:txBody>
+            <a:bodyPr rtlCol="0" anchor="ctr"/>
+            <a:lstStyle/>
+            <a:p>
+              <a:pPr algn="ctr"/>
+              <a:r>
+                <a:rPr lang="en-US" sz="2800" dirty="0" smtClean="0">
+                  <a:solidFill>
+                    <a:schemeClr val="tx1"/>
+                  </a:solidFill>
+                </a:rPr>
+                <a:t>A</a:t>
+              </a:r>
+              <a:endParaRPr lang="en-US" sz="2800" dirty="0">
+                <a:solidFill>
+                  <a:schemeClr val="tx1"/>
+                </a:solidFill>
+              </a:endParaRPr>
+            </a:p>
+          </p:txBody>
+        </p:sp>
+        <p:cxnSp>
+          <p:nvCxnSpPr>
+            <p:cNvPr id="21" name="Straight Arrow Connector 20"/>
+            <p:cNvCxnSpPr/>
+            <p:nvPr/>
+          </p:nvCxnSpPr>
+          <p:spPr>
+            <a:xfrm flipH="1">
+              <a:off x="5976597" y="2537198"/>
+              <a:ext cx="276244" cy="0"/>
             </a:xfrm>
             <a:prstGeom prst="straightConnector1">
               <a:avLst/>
@@ -4016,41 +4823,106 @@
             </a:fontRef>
           </p:style>
         </p:cxnSp>
-        <p:sp>
-          <p:nvSpPr>
-            <p:cNvPr id="44" name="TextBox 43"/>
-            <p:cNvSpPr txBox="1"/>
+        <p:cxnSp>
+          <p:nvCxnSpPr>
+            <p:cNvPr id="22" name="Straight Arrow Connector 21"/>
+            <p:cNvCxnSpPr/>
             <p:nvPr/>
-          </p:nvSpPr>
+          </p:nvCxnSpPr>
           <p:spPr>
             <a:xfrm>
-              <a:off x="7319230" y="2064752"/>
-              <a:ext cx="326081" cy="461665"/>
+              <a:off x="5976597" y="3225504"/>
+              <a:ext cx="354728" cy="1444"/>
             </a:xfrm>
-            <a:prstGeom prst="rect">
+            <a:prstGeom prst="straightConnector1">
               <a:avLst/>
             </a:prstGeom>
-            <a:noFill/>
+            <a:ln w="38100" cmpd="sng">
+              <a:solidFill>
+                <a:srgbClr val="000090"/>
+              </a:solidFill>
+              <a:tailEnd type="arrow"/>
+            </a:ln>
           </p:spPr>
-          <p:txBody>
-            <a:bodyPr wrap="none" rtlCol="0">
-              <a:spAutoFit/>
-            </a:bodyPr>
-            <a:lstStyle/>
-            <a:p>
-              <a:r>
-                <a:rPr lang="en-US" sz="2400" dirty="0" smtClean="0"/>
-                <a:t>S</a:t>
-              </a:r>
-              <a:endParaRPr lang="en-US" sz="2400" dirty="0"/>
-            </a:p>
-          </p:txBody>
-        </p:sp>
+          <p:style>
+            <a:lnRef idx="2">
+              <a:schemeClr val="accent1"/>
+            </a:lnRef>
+            <a:fillRef idx="0">
+              <a:schemeClr val="accent1"/>
+            </a:fillRef>
+            <a:effectRef idx="1">
+              <a:schemeClr val="accent1"/>
+            </a:effectRef>
+            <a:fontRef idx="minor">
+              <a:schemeClr val="tx1"/>
+            </a:fontRef>
+          </p:style>
+        </p:cxnSp>
       </p:grpSp>
+      <p:sp>
+        <p:nvSpPr>
+          <p:cNvPr id="19" name="TextBox 18"/>
+          <p:cNvSpPr txBox="1"/>
+          <p:nvPr/>
+        </p:nvSpPr>
+        <p:spPr>
+          <a:xfrm>
+            <a:off x="5819597" y="1962114"/>
+            <a:ext cx="348773" cy="461665"/>
+          </a:xfrm>
+          <a:prstGeom prst="rect">
+            <a:avLst/>
+          </a:prstGeom>
+          <a:noFill/>
+        </p:spPr>
+        <p:txBody>
+          <a:bodyPr wrap="none" rtlCol="0">
+            <a:spAutoFit/>
+          </a:bodyPr>
+          <a:lstStyle/>
+          <a:p>
+            <a:r>
+              <a:rPr lang="en-US" sz="2400" dirty="0"/>
+              <a:t>C</a:t>
+            </a:r>
+          </a:p>
+        </p:txBody>
+      </p:sp>
+      <p:sp>
+        <p:nvSpPr>
+          <p:cNvPr id="2" name="TextBox 1"/>
+          <p:cNvSpPr txBox="1"/>
+          <p:nvPr/>
+        </p:nvSpPr>
+        <p:spPr>
+          <a:xfrm>
+            <a:off x="6928068" y="3240689"/>
+            <a:ext cx="264691" cy="369332"/>
+          </a:xfrm>
+          <a:prstGeom prst="rect">
+            <a:avLst/>
+          </a:prstGeom>
+          <a:noFill/>
+        </p:spPr>
+        <p:txBody>
+          <a:bodyPr wrap="none" rtlCol="0">
+            <a:spAutoFit/>
+          </a:bodyPr>
+          <a:lstStyle/>
+          <a:p>
+            <a:r>
+              <a:rPr lang="en-US" b="1" dirty="0" smtClean="0"/>
+              <a:t>t</a:t>
+            </a:r>
+            <a:endParaRPr lang="en-US" b="1" dirty="0"/>
+          </a:p>
+        </p:txBody>
+      </p:sp>
     </p:spTree>
     <p:extLst>
       <p:ext uri="{BB962C8B-B14F-4D97-AF65-F5344CB8AC3E}">
-        <p14:creationId xmlns:p14="http://schemas.microsoft.com/office/powerpoint/2010/main" val="4241536918"/>
+        <p14:creationId xmlns:p14="http://schemas.microsoft.com/office/powerpoint/2010/main" val="954399188"/>
       </p:ext>
     </p:extLst>
   </p:cSld>

</xml_diff>

<commit_message>
Delete sentence requiring num pages in Griffins Update figures with missing labels to follow explanation
</commit_message>
<xml_diff>
--- a/content/maxwell1_fundamentals/fundamental_laws/images/BC_1.pptx
+++ b/content/maxwell1_fundamentals/fundamental_laws/images/BC_1.pptx
@@ -290,7 +290,7 @@
           <a:p>
             <a:fld id="{044FDD51-7EA2-AE42-BDCF-AA1B218633D7}" type="datetimeFigureOut">
               <a:rPr lang="en-US" smtClean="0"/>
-              <a:t>15-11-16</a:t>
+              <a:t>15-11-23</a:t>
             </a:fld>
             <a:endParaRPr lang="en-US"/>
           </a:p>
@@ -460,7 +460,7 @@
           <a:p>
             <a:fld id="{044FDD51-7EA2-AE42-BDCF-AA1B218633D7}" type="datetimeFigureOut">
               <a:rPr lang="en-US" smtClean="0"/>
-              <a:t>15-11-16</a:t>
+              <a:t>15-11-23</a:t>
             </a:fld>
             <a:endParaRPr lang="en-US"/>
           </a:p>
@@ -640,7 +640,7 @@
           <a:p>
             <a:fld id="{044FDD51-7EA2-AE42-BDCF-AA1B218633D7}" type="datetimeFigureOut">
               <a:rPr lang="en-US" smtClean="0"/>
-              <a:t>15-11-16</a:t>
+              <a:t>15-11-23</a:t>
             </a:fld>
             <a:endParaRPr lang="en-US"/>
           </a:p>
@@ -810,7 +810,7 @@
           <a:p>
             <a:fld id="{044FDD51-7EA2-AE42-BDCF-AA1B218633D7}" type="datetimeFigureOut">
               <a:rPr lang="en-US" smtClean="0"/>
-              <a:t>15-11-16</a:t>
+              <a:t>15-11-23</a:t>
             </a:fld>
             <a:endParaRPr lang="en-US"/>
           </a:p>
@@ -1056,7 +1056,7 @@
           <a:p>
             <a:fld id="{044FDD51-7EA2-AE42-BDCF-AA1B218633D7}" type="datetimeFigureOut">
               <a:rPr lang="en-US" smtClean="0"/>
-              <a:t>15-11-16</a:t>
+              <a:t>15-11-23</a:t>
             </a:fld>
             <a:endParaRPr lang="en-US"/>
           </a:p>
@@ -1344,7 +1344,7 @@
           <a:p>
             <a:fld id="{044FDD51-7EA2-AE42-BDCF-AA1B218633D7}" type="datetimeFigureOut">
               <a:rPr lang="en-US" smtClean="0"/>
-              <a:t>15-11-16</a:t>
+              <a:t>15-11-23</a:t>
             </a:fld>
             <a:endParaRPr lang="en-US"/>
           </a:p>
@@ -1766,7 +1766,7 @@
           <a:p>
             <a:fld id="{044FDD51-7EA2-AE42-BDCF-AA1B218633D7}" type="datetimeFigureOut">
               <a:rPr lang="en-US" smtClean="0"/>
-              <a:t>15-11-16</a:t>
+              <a:t>15-11-23</a:t>
             </a:fld>
             <a:endParaRPr lang="en-US"/>
           </a:p>
@@ -1884,7 +1884,7 @@
           <a:p>
             <a:fld id="{044FDD51-7EA2-AE42-BDCF-AA1B218633D7}" type="datetimeFigureOut">
               <a:rPr lang="en-US" smtClean="0"/>
-              <a:t>15-11-16</a:t>
+              <a:t>15-11-23</a:t>
             </a:fld>
             <a:endParaRPr lang="en-US"/>
           </a:p>
@@ -1979,7 +1979,7 @@
           <a:p>
             <a:fld id="{044FDD51-7EA2-AE42-BDCF-AA1B218633D7}" type="datetimeFigureOut">
               <a:rPr lang="en-US" smtClean="0"/>
-              <a:t>15-11-16</a:t>
+              <a:t>15-11-23</a:t>
             </a:fld>
             <a:endParaRPr lang="en-US"/>
           </a:p>
@@ -2256,7 +2256,7 @@
           <a:p>
             <a:fld id="{044FDD51-7EA2-AE42-BDCF-AA1B218633D7}" type="datetimeFigureOut">
               <a:rPr lang="en-US" smtClean="0"/>
-              <a:t>15-11-16</a:t>
+              <a:t>15-11-23</a:t>
             </a:fld>
             <a:endParaRPr lang="en-US"/>
           </a:p>
@@ -2509,7 +2509,7 @@
           <a:p>
             <a:fld id="{044FDD51-7EA2-AE42-BDCF-AA1B218633D7}" type="datetimeFigureOut">
               <a:rPr lang="en-US" smtClean="0"/>
-              <a:t>15-11-16</a:t>
+              <a:t>15-11-23</a:t>
             </a:fld>
             <a:endParaRPr lang="en-US"/>
           </a:p>
@@ -2722,7 +2722,7 @@
           <a:p>
             <a:fld id="{044FDD51-7EA2-AE42-BDCF-AA1B218633D7}" type="datetimeFigureOut">
               <a:rPr lang="en-US" smtClean="0"/>
-              <a:t>15-11-16</a:t>
+              <a:t>15-11-23</a:t>
             </a:fld>
             <a:endParaRPr lang="en-US"/>
           </a:p>
@@ -3364,11 +3364,7 @@
             </a:r>
             <a:r>
               <a:rPr lang="en-US" sz="2400" b="1" dirty="0" smtClean="0"/>
-              <a:t> </a:t>
-            </a:r>
-            <a:r>
-              <a:rPr lang="en-US" sz="2400" b="1" dirty="0" smtClean="0"/>
-              <a:t>h</a:t>
+              <a:t> h</a:t>
             </a:r>
             <a:r>
               <a:rPr lang="en-US" sz="2400" baseline="-25000" dirty="0" smtClean="0"/>
@@ -3402,11 +3398,7 @@
           <a:p>
             <a:r>
               <a:rPr lang="en-US" sz="2000" dirty="0" smtClean="0"/>
-              <a:t>Layer 1:  </a:t>
-            </a:r>
-            <a:r>
-              <a:rPr lang="en-US" sz="2000" dirty="0" smtClean="0"/>
-              <a:t>μ</a:t>
+              <a:t>Layer 1:  μ</a:t>
             </a:r>
             <a:r>
               <a:rPr lang="en-US" sz="2400" baseline="-25000" dirty="0" smtClean="0"/>
@@ -3414,11 +3406,7 @@
             </a:r>
             <a:r>
               <a:rPr lang="en-US" sz="2400" dirty="0" smtClean="0"/>
-              <a:t> </a:t>
-            </a:r>
-            <a:r>
-              <a:rPr lang="en-US" sz="2400" dirty="0" smtClean="0"/>
-              <a:t>, ε</a:t>
+              <a:t> , ε</a:t>
             </a:r>
             <a:r>
               <a:rPr lang="en-US" sz="2400" baseline="-25000" dirty="0" smtClean="0"/>
@@ -3456,15 +3444,7 @@
                   <a:srgbClr val="000000"/>
                 </a:solidFill>
               </a:rPr>
-              <a:t>Layer 2:  </a:t>
-            </a:r>
-            <a:r>
-              <a:rPr lang="en-US" sz="2000" dirty="0" smtClean="0">
-                <a:solidFill>
-                  <a:srgbClr val="000000"/>
-                </a:solidFill>
-              </a:rPr>
-              <a:t>μ</a:t>
+              <a:t>Layer 2:  μ</a:t>
             </a:r>
             <a:r>
               <a:rPr lang="en-US" sz="2400" baseline="-25000" dirty="0" smtClean="0">
@@ -3480,15 +3460,7 @@
                   <a:srgbClr val="000000"/>
                 </a:solidFill>
               </a:rPr>
-              <a:t> </a:t>
-            </a:r>
-            <a:r>
-              <a:rPr lang="en-US" sz="2400" dirty="0" smtClean="0">
-                <a:solidFill>
-                  <a:srgbClr val="000000"/>
-                </a:solidFill>
-              </a:rPr>
-              <a:t>, ε</a:t>
+              <a:t> , ε</a:t>
             </a:r>
             <a:r>
               <a:rPr lang="en-US" sz="2400" baseline="-25000" dirty="0">
@@ -3523,7 +3495,7 @@
           <a:graphicData uri="http://schemas.openxmlformats.org/presentationml/2006/ole">
             <mc:AlternateContent xmlns:mc="http://schemas.openxmlformats.org/markup-compatibility/2006">
               <mc:Choice xmlns:v="urn:schemas-microsoft-com:vml" Requires="v">
-                <p:oleObj spid="_x0000_s1046" name="Equation" r:id="rId3" imgW="114300" imgH="165100" progId="Equation.3">
+                <p:oleObj spid="_x0000_s1060" name="Equation" r:id="rId3" imgW="114300" imgH="165100" progId="Equation.3">
                   <p:embed/>
                 </p:oleObj>
               </mc:Choice>
@@ -3653,7 +3625,7 @@
           <p:spPr>
             <a:xfrm>
               <a:off x="4629150" y="2953680"/>
-              <a:ext cx="349825" cy="461665"/>
+              <a:ext cx="184666" cy="461665"/>
             </a:xfrm>
             <a:prstGeom prst="rect">
               <a:avLst/>
@@ -3666,10 +3638,6 @@
             </a:bodyPr>
             <a:lstStyle/>
             <a:p>
-              <a:r>
-                <a:rPr lang="en-US" sz="2400" b="1" dirty="0" smtClean="0"/>
-                <a:t>n</a:t>
-              </a:r>
               <a:endParaRPr lang="en-US" sz="2400" b="1" dirty="0"/>
             </a:p>
           </p:txBody>
@@ -3683,7 +3651,7 @@
           <p:spPr>
             <a:xfrm>
               <a:off x="4647490" y="2328205"/>
-              <a:ext cx="291366" cy="461665"/>
+              <a:ext cx="184666" cy="461665"/>
             </a:xfrm>
             <a:prstGeom prst="rect">
               <a:avLst/>
@@ -3696,10 +3664,7 @@
             </a:bodyPr>
             <a:lstStyle/>
             <a:p>
-              <a:r>
-                <a:rPr lang="en-US" sz="2400" b="1" dirty="0"/>
-                <a:t>t</a:t>
-              </a:r>
+              <a:endParaRPr lang="en-US" sz="2400" b="1" dirty="0"/>
             </a:p>
           </p:txBody>
         </p:sp>
@@ -3782,6 +3747,120 @@
           </a:p>
         </p:txBody>
       </p:sp>
+      <p:graphicFrame>
+        <p:nvGraphicFramePr>
+          <p:cNvPr id="2" name="Object 1"/>
+          <p:cNvGraphicFramePr>
+            <a:graphicFrameLocks noChangeAspect="1"/>
+          </p:cNvGraphicFramePr>
+          <p:nvPr>
+            <p:extLst>
+              <p:ext uri="{D42A27DB-BD31-4B8C-83A1-F6EECF244321}">
+                <p14:modId xmlns:p14="http://schemas.microsoft.com/office/powerpoint/2010/main" val="4152361029"/>
+              </p:ext>
+            </p:extLst>
+          </p:nvPr>
+        </p:nvGraphicFramePr>
+        <p:xfrm>
+          <a:off x="5784379" y="2534779"/>
+          <a:ext cx="192218" cy="288012"/>
+        </p:xfrm>
+        <a:graphic>
+          <a:graphicData uri="http://schemas.openxmlformats.org/presentationml/2006/ole">
+            <mc:AlternateContent xmlns:mc="http://schemas.openxmlformats.org/markup-compatibility/2006">
+              <mc:Choice xmlns:v="urn:schemas-microsoft-com:vml" Requires="v">
+                <p:oleObj spid="_x0000_s1061" name="Equation" r:id="rId5" imgW="114300" imgH="203200" progId="Equation.3">
+                  <p:embed/>
+                </p:oleObj>
+              </mc:Choice>
+              <mc:Fallback>
+                <p:oleObj name="Equation" r:id="rId5" imgW="114300" imgH="203200" progId="Equation.3">
+                  <p:embed/>
+                  <p:pic>
+                    <p:nvPicPr>
+                      <p:cNvPr id="0" name=""/>
+                      <p:cNvPicPr/>
+                      <p:nvPr/>
+                    </p:nvPicPr>
+                    <p:blipFill>
+                      <a:blip r:embed="rId6"/>
+                      <a:stretch>
+                        <a:fillRect/>
+                      </a:stretch>
+                    </p:blipFill>
+                    <p:spPr>
+                      <a:xfrm>
+                        <a:off x="5784379" y="2534779"/>
+                        <a:ext cx="192218" cy="288012"/>
+                      </a:xfrm>
+                      <a:prstGeom prst="rect">
+                        <a:avLst/>
+                      </a:prstGeom>
+                    </p:spPr>
+                  </p:pic>
+                </p:oleObj>
+              </mc:Fallback>
+            </mc:AlternateContent>
+          </a:graphicData>
+        </a:graphic>
+      </p:graphicFrame>
+      <p:graphicFrame>
+        <p:nvGraphicFramePr>
+          <p:cNvPr id="19" name="Object 18"/>
+          <p:cNvGraphicFramePr>
+            <a:graphicFrameLocks noChangeAspect="1"/>
+          </p:cNvGraphicFramePr>
+          <p:nvPr>
+            <p:extLst>
+              <p:ext uri="{D42A27DB-BD31-4B8C-83A1-F6EECF244321}">
+                <p14:modId xmlns:p14="http://schemas.microsoft.com/office/powerpoint/2010/main" val="3656338689"/>
+              </p:ext>
+            </p:extLst>
+          </p:nvPr>
+        </p:nvGraphicFramePr>
+        <p:xfrm>
+          <a:off x="5410484" y="3178782"/>
+          <a:ext cx="200605" cy="236563"/>
+        </p:xfrm>
+        <a:graphic>
+          <a:graphicData uri="http://schemas.openxmlformats.org/presentationml/2006/ole">
+            <mc:AlternateContent xmlns:mc="http://schemas.openxmlformats.org/markup-compatibility/2006">
+              <mc:Choice xmlns:v="urn:schemas-microsoft-com:vml" Requires="v">
+                <p:oleObj spid="_x0000_s1062" name="Equation" r:id="rId7" imgW="127000" imgH="177800" progId="Equation.3">
+                  <p:embed/>
+                </p:oleObj>
+              </mc:Choice>
+              <mc:Fallback>
+                <p:oleObj name="Equation" r:id="rId7" imgW="127000" imgH="177800" progId="Equation.3">
+                  <p:embed/>
+                  <p:pic>
+                    <p:nvPicPr>
+                      <p:cNvPr id="0" name=""/>
+                      <p:cNvPicPr/>
+                      <p:nvPr/>
+                    </p:nvPicPr>
+                    <p:blipFill>
+                      <a:blip r:embed="rId8"/>
+                      <a:stretch>
+                        <a:fillRect/>
+                      </a:stretch>
+                    </p:blipFill>
+                    <p:spPr>
+                      <a:xfrm>
+                        <a:off x="5410484" y="3178782"/>
+                        <a:ext cx="200605" cy="236563"/>
+                      </a:xfrm>
+                      <a:prstGeom prst="rect">
+                        <a:avLst/>
+                      </a:prstGeom>
+                    </p:spPr>
+                  </p:pic>
+                </p:oleObj>
+              </mc:Fallback>
+            </mc:AlternateContent>
+          </a:graphicData>
+        </a:graphic>
+      </p:graphicFrame>
     </p:spTree>
     <p:extLst>
       <p:ext uri="{BB962C8B-B14F-4D97-AF65-F5344CB8AC3E}">
@@ -3978,7 +4057,7 @@
           <a:graphicData uri="http://schemas.openxmlformats.org/presentationml/2006/ole">
             <mc:AlternateContent xmlns:mc="http://schemas.openxmlformats.org/markup-compatibility/2006">
               <mc:Choice xmlns:v="urn:schemas-microsoft-com:vml" Requires="v">
-                <p:oleObj spid="_x0000_s2065" name="Equation" r:id="rId3" imgW="114300" imgH="165100" progId="Equation.3">
+                <p:oleObj spid="_x0000_s2074" name="Equation" r:id="rId3" imgW="114300" imgH="165100" progId="Equation.3">
                   <p:embed/>
                 </p:oleObj>
               </mc:Choice>
@@ -4166,36 +4245,6 @@
       </p:sp>
       <p:sp>
         <p:nvSpPr>
-          <p:cNvPr id="28" name="TextBox 27"/>
-          <p:cNvSpPr txBox="1"/>
-          <p:nvPr/>
-        </p:nvSpPr>
-        <p:spPr>
-          <a:xfrm>
-            <a:off x="6945818" y="1844947"/>
-            <a:ext cx="362875" cy="369332"/>
-          </a:xfrm>
-          <a:prstGeom prst="rect">
-            <a:avLst/>
-          </a:prstGeom>
-          <a:noFill/>
-        </p:spPr>
-        <p:txBody>
-          <a:bodyPr wrap="none" rtlCol="0">
-            <a:spAutoFit/>
-          </a:bodyPr>
-          <a:lstStyle/>
-          <a:p>
-            <a:r>
-              <a:rPr lang="en-US" b="1" i="1" dirty="0" smtClean="0"/>
-              <a:t>n</a:t>
-            </a:r>
-            <a:endParaRPr lang="en-US" b="1" i="1" dirty="0"/>
-          </a:p>
-        </p:txBody>
-      </p:sp>
-      <p:sp>
-        <p:nvSpPr>
           <p:cNvPr id="3" name="TextBox 2"/>
           <p:cNvSpPr txBox="1"/>
           <p:nvPr/>
@@ -4333,6 +4382,135 @@
               <a:t>Boundary conditions for D, B</a:t>
             </a:r>
             <a:endParaRPr lang="en-US" dirty="0"/>
+          </a:p>
+        </p:txBody>
+      </p:sp>
+      <p:graphicFrame>
+        <p:nvGraphicFramePr>
+          <p:cNvPr id="16" name="Object 15"/>
+          <p:cNvGraphicFramePr>
+            <a:graphicFrameLocks noChangeAspect="1"/>
+          </p:cNvGraphicFramePr>
+          <p:nvPr>
+            <p:extLst>
+              <p:ext uri="{D42A27DB-BD31-4B8C-83A1-F6EECF244321}">
+                <p14:modId xmlns:p14="http://schemas.microsoft.com/office/powerpoint/2010/main" val="2315703654"/>
+              </p:ext>
+            </p:extLst>
+          </p:nvPr>
+        </p:nvGraphicFramePr>
+        <p:xfrm>
+          <a:off x="6842267" y="1726665"/>
+          <a:ext cx="200605" cy="236563"/>
+        </p:xfrm>
+        <a:graphic>
+          <a:graphicData uri="http://schemas.openxmlformats.org/presentationml/2006/ole">
+            <mc:AlternateContent xmlns:mc="http://schemas.openxmlformats.org/markup-compatibility/2006">
+              <mc:Choice xmlns:v="urn:schemas-microsoft-com:vml" Requires="v">
+                <p:oleObj spid="_x0000_s2075" name="Equation" r:id="rId5" imgW="127000" imgH="177800" progId="Equation.3">
+                  <p:embed/>
+                </p:oleObj>
+              </mc:Choice>
+              <mc:Fallback>
+                <p:oleObj name="Equation" r:id="rId5" imgW="127000" imgH="177800" progId="Equation.3">
+                  <p:embed/>
+                  <p:pic>
+                    <p:nvPicPr>
+                      <p:cNvPr id="0" name=""/>
+                      <p:cNvPicPr/>
+                      <p:nvPr/>
+                    </p:nvPicPr>
+                    <p:blipFill>
+                      <a:blip r:embed="rId6"/>
+                      <a:stretch>
+                        <a:fillRect/>
+                      </a:stretch>
+                    </p:blipFill>
+                    <p:spPr>
+                      <a:xfrm>
+                        <a:off x="6842267" y="1726665"/>
+                        <a:ext cx="200605" cy="236563"/>
+                      </a:xfrm>
+                      <a:prstGeom prst="rect">
+                        <a:avLst/>
+                      </a:prstGeom>
+                    </p:spPr>
+                  </p:pic>
+                </p:oleObj>
+              </mc:Fallback>
+            </mc:AlternateContent>
+          </a:graphicData>
+        </a:graphic>
+      </p:graphicFrame>
+      <p:cxnSp>
+        <p:nvCxnSpPr>
+          <p:cNvPr id="4" name="Straight Arrow Connector 3"/>
+          <p:cNvCxnSpPr/>
+          <p:nvPr/>
+        </p:nvCxnSpPr>
+        <p:spPr>
+          <a:xfrm>
+            <a:off x="6942570" y="2521492"/>
+            <a:ext cx="1395637" cy="0"/>
+          </a:xfrm>
+          <a:prstGeom prst="straightConnector1">
+            <a:avLst/>
+          </a:prstGeom>
+          <a:ln>
+            <a:solidFill>
+              <a:schemeClr val="tx1">
+                <a:lumMod val="75000"/>
+                <a:lumOff val="25000"/>
+              </a:schemeClr>
+            </a:solidFill>
+            <a:tailEnd type="arrow"/>
+          </a:ln>
+        </p:spPr>
+        <p:style>
+          <a:lnRef idx="2">
+            <a:schemeClr val="accent1"/>
+          </a:lnRef>
+          <a:fillRef idx="0">
+            <a:schemeClr val="accent1"/>
+          </a:fillRef>
+          <a:effectRef idx="1">
+            <a:schemeClr val="accent1"/>
+          </a:effectRef>
+          <a:fontRef idx="minor">
+            <a:schemeClr val="tx1"/>
+          </a:fontRef>
+        </p:style>
+      </p:cxnSp>
+      <p:sp>
+        <p:nvSpPr>
+          <p:cNvPr id="21" name="Rectangle 20"/>
+          <p:cNvSpPr/>
+          <p:nvPr/>
+        </p:nvSpPr>
+        <p:spPr>
+          <a:xfrm>
+            <a:off x="7827528" y="2126681"/>
+            <a:ext cx="432186" cy="307777"/>
+          </a:xfrm>
+          <a:prstGeom prst="rect">
+            <a:avLst/>
+          </a:prstGeom>
+        </p:spPr>
+        <p:txBody>
+          <a:bodyPr wrap="none">
+            <a:spAutoFit/>
+          </a:bodyPr>
+          <a:lstStyle/>
+          <a:p>
+            <a:r>
+              <a:rPr lang="en-US" sz="1400" i="1" dirty="0" smtClean="0"/>
+              <a:t>r</a:t>
+            </a:r>
+            <a:r>
+              <a:rPr lang="en-US" sz="1400" baseline="-25000" dirty="0" smtClean="0"/>
+              <a:t>top</a:t>
+            </a:r>
+            <a:endParaRPr lang="en-US" sz="1400" dirty="0"/>
           </a:p>
         </p:txBody>
       </p:sp>
@@ -4536,7 +4714,7 @@
           <a:graphicData uri="http://schemas.openxmlformats.org/presentationml/2006/ole">
             <mc:AlternateContent xmlns:mc="http://schemas.openxmlformats.org/markup-compatibility/2006">
               <mc:Choice xmlns:v="urn:schemas-microsoft-com:vml" Requires="v">
-                <p:oleObj spid="_x0000_s4105" name="Equation" r:id="rId3" imgW="114300" imgH="165100" progId="Equation.3">
+                <p:oleObj spid="_x0000_s4114" name="Equation" r:id="rId3" imgW="114300" imgH="165100" progId="Equation.3">
                   <p:embed/>
                 </p:oleObj>
               </mc:Choice>
@@ -4893,16 +5071,73 @@
           </a:p>
         </p:txBody>
       </p:sp>
-      <p:sp>
-        <p:nvSpPr>
-          <p:cNvPr id="2" name="TextBox 1"/>
+      <p:graphicFrame>
+        <p:nvGraphicFramePr>
+          <p:cNvPr id="23" name="Object 22"/>
+          <p:cNvGraphicFramePr>
+            <a:graphicFrameLocks noChangeAspect="1"/>
+          </p:cNvGraphicFramePr>
+          <p:nvPr>
+            <p:extLst>
+              <p:ext uri="{D42A27DB-BD31-4B8C-83A1-F6EECF244321}">
+                <p14:modId xmlns:p14="http://schemas.microsoft.com/office/powerpoint/2010/main" val="49232861"/>
+              </p:ext>
+            </p:extLst>
+          </p:nvPr>
+        </p:nvGraphicFramePr>
+        <p:xfrm>
+          <a:off x="6966792" y="2086753"/>
+          <a:ext cx="192218" cy="288012"/>
+        </p:xfrm>
+        <a:graphic>
+          <a:graphicData uri="http://schemas.openxmlformats.org/presentationml/2006/ole">
+            <mc:AlternateContent xmlns:mc="http://schemas.openxmlformats.org/markup-compatibility/2006">
+              <mc:Choice xmlns:v="urn:schemas-microsoft-com:vml" Requires="v">
+                <p:oleObj spid="_x0000_s4115" name="Equation" r:id="rId5" imgW="114300" imgH="203200" progId="Equation.3">
+                  <p:embed/>
+                </p:oleObj>
+              </mc:Choice>
+              <mc:Fallback>
+                <p:oleObj name="Equation" r:id="rId5" imgW="114300" imgH="203200" progId="Equation.3">
+                  <p:embed/>
+                  <p:pic>
+                    <p:nvPicPr>
+                      <p:cNvPr id="0" name=""/>
+                      <p:cNvPicPr/>
+                      <p:nvPr/>
+                    </p:nvPicPr>
+                    <p:blipFill>
+                      <a:blip r:embed="rId6"/>
+                      <a:stretch>
+                        <a:fillRect/>
+                      </a:stretch>
+                    </p:blipFill>
+                    <p:spPr>
+                      <a:xfrm>
+                        <a:off x="6966792" y="2086753"/>
+                        <a:ext cx="192218" cy="288012"/>
+                      </a:xfrm>
+                      <a:prstGeom prst="rect">
+                        <a:avLst/>
+                      </a:prstGeom>
+                    </p:spPr>
+                  </p:pic>
+                </p:oleObj>
+              </mc:Fallback>
+            </mc:AlternateContent>
+          </a:graphicData>
+        </a:graphic>
+      </p:graphicFrame>
+      <p:sp>
+        <p:nvSpPr>
+          <p:cNvPr id="25" name="TextBox 24"/>
           <p:cNvSpPr txBox="1"/>
           <p:nvPr/>
         </p:nvSpPr>
         <p:spPr>
           <a:xfrm>
-            <a:off x="6928068" y="3240689"/>
-            <a:ext cx="264691" cy="369332"/>
+            <a:off x="5588491" y="3511550"/>
+            <a:ext cx="482111" cy="307777"/>
           </a:xfrm>
           <a:prstGeom prst="rect">
             <a:avLst/>
@@ -4916,13 +5151,123 @@
           <a:lstStyle/>
           <a:p>
             <a:r>
-              <a:rPr lang="en-US" b="1" dirty="0" smtClean="0"/>
-              <a:t>t</a:t>
-            </a:r>
-            <a:endParaRPr lang="en-US" b="1" dirty="0"/>
-          </a:p>
-        </p:txBody>
-      </p:sp>
+              <a:rPr lang="en-US" sz="1400" i="1" dirty="0" smtClean="0">
+                <a:latin typeface="Times"/>
+                <a:cs typeface="Times"/>
+              </a:rPr>
+              <a:t>-l</a:t>
+            </a:r>
+            <a:r>
+              <a:rPr lang="en-US" sz="1400" i="1" dirty="0" smtClean="0">
+                <a:latin typeface="Times"/>
+                <a:cs typeface="Times"/>
+              </a:rPr>
+              <a:t>/</a:t>
+            </a:r>
+            <a:r>
+              <a:rPr lang="en-US" sz="1400" i="1" dirty="0" smtClean="0">
+                <a:latin typeface="Times"/>
+                <a:cs typeface="Times"/>
+              </a:rPr>
+              <a:t>2</a:t>
+            </a:r>
+            <a:endParaRPr lang="en-US" sz="1400" i="1" dirty="0">
+              <a:latin typeface="Times"/>
+              <a:cs typeface="Times"/>
+            </a:endParaRPr>
+          </a:p>
+        </p:txBody>
+      </p:sp>
+      <p:sp>
+        <p:nvSpPr>
+          <p:cNvPr id="26" name="TextBox 25"/>
+          <p:cNvSpPr txBox="1"/>
+          <p:nvPr/>
+        </p:nvSpPr>
+        <p:spPr>
+          <a:xfrm>
+            <a:off x="8179596" y="3525432"/>
+            <a:ext cx="422324" cy="307777"/>
+          </a:xfrm>
+          <a:prstGeom prst="rect">
+            <a:avLst/>
+          </a:prstGeom>
+          <a:noFill/>
+        </p:spPr>
+        <p:txBody>
+          <a:bodyPr wrap="none" rtlCol="0">
+            <a:spAutoFit/>
+          </a:bodyPr>
+          <a:lstStyle/>
+          <a:p>
+            <a:r>
+              <a:rPr lang="en-US" sz="1400" i="1" dirty="0" smtClean="0">
+                <a:latin typeface="Times"/>
+                <a:cs typeface="Times"/>
+              </a:rPr>
+              <a:t>l</a:t>
+            </a:r>
+            <a:r>
+              <a:rPr lang="en-US" sz="1400" i="1" dirty="0" smtClean="0">
+                <a:latin typeface="Times"/>
+                <a:cs typeface="Times"/>
+              </a:rPr>
+              <a:t>/</a:t>
+            </a:r>
+            <a:r>
+              <a:rPr lang="en-US" sz="1400" i="1" dirty="0" smtClean="0">
+                <a:latin typeface="Times"/>
+                <a:cs typeface="Times"/>
+              </a:rPr>
+              <a:t>2</a:t>
+            </a:r>
+            <a:endParaRPr lang="en-US" sz="1400" i="1" dirty="0">
+              <a:latin typeface="Times"/>
+              <a:cs typeface="Times"/>
+            </a:endParaRPr>
+          </a:p>
+        </p:txBody>
+      </p:sp>
+      <p:cxnSp>
+        <p:nvCxnSpPr>
+          <p:cNvPr id="27" name="Straight Arrow Connector 26"/>
+          <p:cNvCxnSpPr/>
+          <p:nvPr/>
+        </p:nvCxnSpPr>
+        <p:spPr>
+          <a:xfrm flipH="1">
+            <a:off x="5819598" y="3478979"/>
+            <a:ext cx="2571160" cy="0"/>
+          </a:xfrm>
+          <a:prstGeom prst="straightConnector1">
+            <a:avLst/>
+          </a:prstGeom>
+          <a:ln>
+            <a:solidFill>
+              <a:schemeClr val="tx1">
+                <a:lumMod val="85000"/>
+                <a:lumOff val="15000"/>
+              </a:schemeClr>
+            </a:solidFill>
+            <a:headEnd type="arrow"/>
+            <a:tailEnd type="arrow"/>
+          </a:ln>
+        </p:spPr>
+        <p:style>
+          <a:lnRef idx="2">
+            <a:schemeClr val="accent1"/>
+          </a:lnRef>
+          <a:fillRef idx="0">
+            <a:schemeClr val="accent1"/>
+          </a:fillRef>
+          <a:effectRef idx="1">
+            <a:schemeClr val="accent1"/>
+          </a:effectRef>
+          <a:fontRef idx="minor">
+            <a:schemeClr val="tx1"/>
+          </a:fontRef>
+        </p:style>
+      </p:cxnSp>
     </p:spTree>
     <p:extLst>
       <p:ext uri="{BB962C8B-B14F-4D97-AF65-F5344CB8AC3E}">

</xml_diff>